<commit_message>
Added images for King & Brad
Closes #38
</commit_message>
<xml_diff>
--- a/slides/section/s01-brainstorm.pptx
+++ b/slides/section/s01-brainstorm.pptx
@@ -1,22 +1,22 @@
 
 <file path=ppt/presentation.xml><?xml version="1.0" encoding="utf-8"?>
-<p:presentation xmlns:a="http://schemas.openxmlformats.org/drawingml/2006/main" xmlns:r="http://schemas.openxmlformats.org/officeDocument/2006/relationships" xmlns:mc="http://schemas.openxmlformats.org/markup-compatibility/2006" xmlns:mv="urn:schemas-microsoft-com:mac:vml" xmlns:p="http://schemas.openxmlformats.org/presentationml/2006/main" xmlns:c="http://schemas.openxmlformats.org/drawingml/2006/chart" xmlns:dgm="http://schemas.openxmlformats.org/drawingml/2006/diagram" xmlns:o="urn:schemas-microsoft-com:office:office" xmlns:v="urn:schemas-microsoft-com:vml" xmlns:pvml="urn:schemas-microsoft-com:office:powerpoint" xmlns:com="http://schemas.openxmlformats.org/drawingml/2006/compatibility" xmlns:p14="http://schemas.microsoft.com/office/powerpoint/2010/main" saveSubsetFonts="1" autoCompressPictures="0" strictFirstAndLastChars="0" showSpecialPlsOnTitleSld="0" firstSlideNum="0">
+<p:presentation xmlns:a="http://schemas.openxmlformats.org/drawingml/2006/main" xmlns:r="http://schemas.openxmlformats.org/officeDocument/2006/relationships" xmlns:p="http://schemas.openxmlformats.org/presentationml/2006/main" firstSlideNum="0" showSpecialPlsOnTitleSld="0" strictFirstAndLastChars="0" saveSubsetFonts="1" autoCompressPictures="0">
   <p:sldMasterIdLst>
-    <p:sldMasterId id="2147483654" r:id="rId4"/>
+    <p:sldMasterId id="2147483654" r:id="rId1"/>
   </p:sldMasterIdLst>
   <p:notesMasterIdLst>
-    <p:notesMasterId r:id="rId5"/>
+    <p:notesMasterId r:id="rId6"/>
   </p:notesMasterIdLst>
   <p:sldIdLst>
-    <p:sldId id="256" r:id="rId6"/>
-    <p:sldId id="257" r:id="rId7"/>
-    <p:sldId id="258" r:id="rId8"/>
-    <p:sldId id="259" r:id="rId9"/>
+    <p:sldId id="256" r:id="rId2"/>
+    <p:sldId id="257" r:id="rId3"/>
+    <p:sldId id="258" r:id="rId4"/>
+    <p:sldId id="259" r:id="rId5"/>
   </p:sldIdLst>
-  <p:sldSz cy="5143500" cx="9144000"/>
-  <p:notesSz cy="9144000" cx="6858000"/>
+  <p:sldSz cx="9144000" cy="5143500" type="screen16x9"/>
+  <p:notesSz cx="6858000" cy="9144000"/>
   <p:defaultTextStyle>
-    <a:defPPr algn="l" rtl="0" marR="0">
+    <a:defPPr marR="0" algn="l" rtl="0">
       <a:lnSpc>
         <a:spcPct val="100000"/>
       </a:lnSpc>
@@ -27,7 +27,7 @@
         <a:spcPts val="0"/>
       </a:spcAft>
     </a:defPPr>
-    <a:lvl1pPr algn="l" rtl="0" marR="0">
+    <a:lvl1pPr marR="0" algn="l" rtl="0">
       <a:lnSpc>
         <a:spcPct val="100000"/>
       </a:lnSpc>
@@ -38,7 +38,7 @@
         <a:spcPts val="0"/>
       </a:spcAft>
       <a:buNone/>
-      <a:defRPr strike="noStrike" u="none" b="0" cap="none" baseline="0" sz="1400" i="0">
+      <a:defRPr sz="1400" b="0" i="0" u="none" strike="noStrike" cap="none" baseline="0">
         <a:solidFill>
           <a:srgbClr val="000000"/>
         </a:solidFill>
@@ -49,7 +49,7 @@
         <a:rtl val="0"/>
       </a:defRPr>
     </a:lvl1pPr>
-    <a:lvl2pPr algn="l" rtl="0" marR="0">
+    <a:lvl2pPr marR="0" algn="l" rtl="0">
       <a:lnSpc>
         <a:spcPct val="100000"/>
       </a:lnSpc>
@@ -60,7 +60,7 @@
         <a:spcPts val="0"/>
       </a:spcAft>
       <a:buNone/>
-      <a:defRPr strike="noStrike" u="none" b="0" cap="none" baseline="0" sz="1400" i="0">
+      <a:defRPr sz="1400" b="0" i="0" u="none" strike="noStrike" cap="none" baseline="0">
         <a:solidFill>
           <a:srgbClr val="000000"/>
         </a:solidFill>
@@ -71,7 +71,7 @@
         <a:rtl val="0"/>
       </a:defRPr>
     </a:lvl2pPr>
-    <a:lvl3pPr algn="l" rtl="0" marR="0">
+    <a:lvl3pPr marR="0" algn="l" rtl="0">
       <a:lnSpc>
         <a:spcPct val="100000"/>
       </a:lnSpc>
@@ -82,7 +82,7 @@
         <a:spcPts val="0"/>
       </a:spcAft>
       <a:buNone/>
-      <a:defRPr strike="noStrike" u="none" b="0" cap="none" baseline="0" sz="1400" i="0">
+      <a:defRPr sz="1400" b="0" i="0" u="none" strike="noStrike" cap="none" baseline="0">
         <a:solidFill>
           <a:srgbClr val="000000"/>
         </a:solidFill>
@@ -93,7 +93,7 @@
         <a:rtl val="0"/>
       </a:defRPr>
     </a:lvl3pPr>
-    <a:lvl4pPr algn="l" rtl="0" marR="0">
+    <a:lvl4pPr marR="0" algn="l" rtl="0">
       <a:lnSpc>
         <a:spcPct val="100000"/>
       </a:lnSpc>
@@ -104,7 +104,7 @@
         <a:spcPts val="0"/>
       </a:spcAft>
       <a:buNone/>
-      <a:defRPr strike="noStrike" u="none" b="0" cap="none" baseline="0" sz="1400" i="0">
+      <a:defRPr sz="1400" b="0" i="0" u="none" strike="noStrike" cap="none" baseline="0">
         <a:solidFill>
           <a:srgbClr val="000000"/>
         </a:solidFill>
@@ -115,7 +115,7 @@
         <a:rtl val="0"/>
       </a:defRPr>
     </a:lvl4pPr>
-    <a:lvl5pPr algn="l" rtl="0" marR="0">
+    <a:lvl5pPr marR="0" algn="l" rtl="0">
       <a:lnSpc>
         <a:spcPct val="100000"/>
       </a:lnSpc>
@@ -126,7 +126,7 @@
         <a:spcPts val="0"/>
       </a:spcAft>
       <a:buNone/>
-      <a:defRPr strike="noStrike" u="none" b="0" cap="none" baseline="0" sz="1400" i="0">
+      <a:defRPr sz="1400" b="0" i="0" u="none" strike="noStrike" cap="none" baseline="0">
         <a:solidFill>
           <a:srgbClr val="000000"/>
         </a:solidFill>
@@ -137,7 +137,7 @@
         <a:rtl val="0"/>
       </a:defRPr>
     </a:lvl5pPr>
-    <a:lvl6pPr algn="l" rtl="0" marR="0">
+    <a:lvl6pPr marR="0" algn="l" rtl="0">
       <a:lnSpc>
         <a:spcPct val="100000"/>
       </a:lnSpc>
@@ -148,7 +148,7 @@
         <a:spcPts val="0"/>
       </a:spcAft>
       <a:buNone/>
-      <a:defRPr strike="noStrike" u="none" b="0" cap="none" baseline="0" sz="1400" i="0">
+      <a:defRPr sz="1400" b="0" i="0" u="none" strike="noStrike" cap="none" baseline="0">
         <a:solidFill>
           <a:srgbClr val="000000"/>
         </a:solidFill>
@@ -159,7 +159,7 @@
         <a:rtl val="0"/>
       </a:defRPr>
     </a:lvl6pPr>
-    <a:lvl7pPr algn="l" rtl="0" marR="0">
+    <a:lvl7pPr marR="0" algn="l" rtl="0">
       <a:lnSpc>
         <a:spcPct val="100000"/>
       </a:lnSpc>
@@ -170,7 +170,7 @@
         <a:spcPts val="0"/>
       </a:spcAft>
       <a:buNone/>
-      <a:defRPr strike="noStrike" u="none" b="0" cap="none" baseline="0" sz="1400" i="0">
+      <a:defRPr sz="1400" b="0" i="0" u="none" strike="noStrike" cap="none" baseline="0">
         <a:solidFill>
           <a:srgbClr val="000000"/>
         </a:solidFill>
@@ -181,7 +181,7 @@
         <a:rtl val="0"/>
       </a:defRPr>
     </a:lvl7pPr>
-    <a:lvl8pPr algn="l" rtl="0" marR="0">
+    <a:lvl8pPr marR="0" algn="l" rtl="0">
       <a:lnSpc>
         <a:spcPct val="100000"/>
       </a:lnSpc>
@@ -192,7 +192,7 @@
         <a:spcPts val="0"/>
       </a:spcAft>
       <a:buNone/>
-      <a:defRPr strike="noStrike" u="none" b="0" cap="none" baseline="0" sz="1400" i="0">
+      <a:defRPr sz="1400" b="0" i="0" u="none" strike="noStrike" cap="none" baseline="0">
         <a:solidFill>
           <a:srgbClr val="000000"/>
         </a:solidFill>
@@ -203,7 +203,7 @@
         <a:rtl val="0"/>
       </a:defRPr>
     </a:lvl8pPr>
-    <a:lvl9pPr algn="l" rtl="0" marR="0">
+    <a:lvl9pPr marR="0" algn="l" rtl="0">
       <a:lnSpc>
         <a:spcPct val="100000"/>
       </a:lnSpc>
@@ -214,7 +214,7 @@
         <a:spcPts val="0"/>
       </a:spcAft>
       <a:buNone/>
-      <a:defRPr strike="noStrike" u="none" b="0" cap="none" baseline="0" sz="1400" i="0">
+      <a:defRPr sz="1400" b="0" i="0" u="none" strike="noStrike" cap="none" baseline="0">
         <a:solidFill>
           <a:srgbClr val="000000"/>
         </a:solidFill>
@@ -230,8 +230,13 @@
 </file>
 
 <file path=ppt/notesMasters/notesMaster1.xml><?xml version="1.0" encoding="utf-8"?>
-<p:notesMaster xmlns:a="http://schemas.openxmlformats.org/drawingml/2006/main" xmlns:r="http://schemas.openxmlformats.org/officeDocument/2006/relationships" xmlns:mc="http://schemas.openxmlformats.org/markup-compatibility/2006" xmlns:mv="urn:schemas-microsoft-com:mac:vml" xmlns:p="http://schemas.openxmlformats.org/presentationml/2006/main" xmlns:c="http://schemas.openxmlformats.org/drawingml/2006/chart" xmlns:dgm="http://schemas.openxmlformats.org/drawingml/2006/diagram" xmlns:o="urn:schemas-microsoft-com:office:office" xmlns:v="urn:schemas-microsoft-com:vml" xmlns:pvml="urn:schemas-microsoft-com:office:powerpoint" xmlns:com="http://schemas.openxmlformats.org/drawingml/2006/compatibility" xmlns:p14="http://schemas.microsoft.com/office/powerpoint/2010/main">
+<p:notesMaster xmlns:a="http://schemas.openxmlformats.org/drawingml/2006/main" xmlns:r="http://schemas.openxmlformats.org/officeDocument/2006/relationships" xmlns:p="http://schemas.openxmlformats.org/presentationml/2006/main">
   <p:cSld>
+    <p:bg>
+      <p:bgRef idx="1001">
+        <a:schemeClr val="bg1"/>
+      </p:bgRef>
+    </p:bg>
     <p:spTree>
       <p:nvGrpSpPr>
         <p:cNvPr id="1" name="Shape 1"/>
@@ -240,39 +245,46 @@
       </p:nvGrpSpPr>
       <p:grpSpPr>
         <a:xfrm>
-          <a:off y="0" x="0"/>
-          <a:ext cy="0" cx="0"/>
-          <a:chOff y="0" x="0"/>
-          <a:chExt cy="0" cx="0"/>
+          <a:off x="0" y="0"/>
+          <a:ext cx="0" cy="0"/>
+          <a:chOff x="0" y="0"/>
+          <a:chExt cx="0" cy="0"/>
         </a:xfrm>
       </p:grpSpPr>
       <p:sp>
         <p:nvSpPr>
           <p:cNvPr id="2" name="Shape 2"/>
-          <p:cNvSpPr/>
+          <p:cNvSpPr>
+            <a:spLocks noGrp="1" noRot="1" noChangeAspect="1"/>
+          </p:cNvSpPr>
           <p:nvPr>
-            <p:ph idx="2" type="sldImg"/>
+            <p:ph type="sldImg" idx="2"/>
           </p:nvPr>
         </p:nvSpPr>
         <p:spPr>
           <a:xfrm>
-            <a:off y="685800" x="381187"/>
-            <a:ext cy="3429000" cx="6096299"/>
+            <a:off x="381187" y="685800"/>
+            <a:ext cx="6096299" cy="3429000"/>
           </a:xfrm>
           <a:custGeom>
+            <a:avLst/>
+            <a:gdLst/>
+            <a:ahLst/>
+            <a:cxnLst/>
+            <a:rect l="0" t="0" r="0" b="0"/>
             <a:pathLst>
-              <a:path w="120000" extrusionOk="0" h="120000">
+              <a:path w="120000" h="120000" extrusionOk="0">
                 <a:moveTo>
-                  <a:pt y="0" x="0"/>
+                  <a:pt x="0" y="0"/>
                 </a:moveTo>
                 <a:lnTo>
-                  <a:pt y="0" x="120000"/>
+                  <a:pt x="120000" y="0"/>
                 </a:lnTo>
                 <a:lnTo>
-                  <a:pt y="120000" x="120000"/>
+                  <a:pt x="120000" y="120000"/>
                 </a:lnTo>
                 <a:lnTo>
-                  <a:pt y="120000" x="0"/>
+                  <a:pt x="0" y="120000"/>
                 </a:lnTo>
                 <a:close/>
               </a:path>
@@ -285,23 +297,25 @@
             </a:solidFill>
             <a:prstDash val="solid"/>
             <a:round/>
-            <a:headEnd w="med" len="med" type="none"/>
-            <a:tailEnd w="med" len="med" type="none"/>
+            <a:headEnd type="none" w="med" len="med"/>
+            <a:tailEnd type="none" w="med" len="med"/>
           </a:ln>
         </p:spPr>
       </p:sp>
       <p:sp>
         <p:nvSpPr>
           <p:cNvPr id="3" name="Shape 3"/>
-          <p:cNvSpPr txBox="1"/>
+          <p:cNvSpPr txBox="1">
+            <a:spLocks noGrp="1"/>
+          </p:cNvSpPr>
           <p:nvPr>
-            <p:ph idx="1" type="body"/>
+            <p:ph type="body" idx="1"/>
           </p:nvPr>
         </p:nvSpPr>
         <p:spPr>
           <a:xfrm>
-            <a:off y="4343400" x="685800"/>
-            <a:ext cy="4114800" cx="5486399"/>
+            <a:off x="685800" y="4343400"/>
+            <a:ext cx="5486399" cy="4114800"/>
           </a:xfrm>
           <a:prstGeom prst="rect">
             <a:avLst/>
@@ -312,7 +326,7 @@
           </a:ln>
         </p:spPr>
         <p:txBody>
-          <a:bodyPr bIns="91425" rIns="91425" lIns="91425" tIns="91425" anchor="t" anchorCtr="0"/>
+          <a:bodyPr lIns="91425" tIns="91425" rIns="91425" bIns="91425" anchor="t" anchorCtr="0"/>
           <a:lstStyle>
             <a:lvl1pPr>
               <a:spcBef>
@@ -369,59 +383,165 @@
               <a:defRPr sz="1100"/>
             </a:lvl9pPr>
           </a:lstStyle>
-          <a:p/>
+          <a:p>
+            <a:endParaRPr/>
+          </a:p>
         </p:txBody>
       </p:sp>
     </p:spTree>
+    <p:extLst>
+      <p:ext uri="{BB962C8B-B14F-4D97-AF65-F5344CB8AC3E}">
+        <p14:creationId xmlns:p14="http://schemas.microsoft.com/office/powerpoint/2010/main" val="3839578882"/>
+      </p:ext>
+    </p:extLst>
   </p:cSld>
-  <p:clrMap accent2="accent2" accent3="accent3" accent4="accent4" accent5="accent5" accent6="accent6" hlink="hlink" tx2="lt2" tx1="dk1" bg2="dk2" bg1="lt1" folHlink="folHlink" accent1="accent1"/>
+  <p:clrMap bg1="lt1" tx1="dk1" bg2="dk2" tx2="lt2" accent1="accent1" accent2="accent2" accent3="accent3" accent4="accent4" accent5="accent5" accent6="accent6" hlink="hlink" folHlink="folHlink"/>
+  <p:notesStyle>
+    <a:lvl1pPr marL="0" algn="l" defTabSz="457200" rtl="0" eaLnBrk="1" latinLnBrk="0" hangingPunct="1">
+      <a:defRPr sz="1200" kern="1200">
+        <a:solidFill>
+          <a:schemeClr val="tx1"/>
+        </a:solidFill>
+        <a:latin typeface="+mn-lt"/>
+        <a:ea typeface="+mn-ea"/>
+        <a:cs typeface="+mn-cs"/>
+      </a:defRPr>
+    </a:lvl1pPr>
+    <a:lvl2pPr marL="457200" algn="l" defTabSz="457200" rtl="0" eaLnBrk="1" latinLnBrk="0" hangingPunct="1">
+      <a:defRPr sz="1200" kern="1200">
+        <a:solidFill>
+          <a:schemeClr val="tx1"/>
+        </a:solidFill>
+        <a:latin typeface="+mn-lt"/>
+        <a:ea typeface="+mn-ea"/>
+        <a:cs typeface="+mn-cs"/>
+      </a:defRPr>
+    </a:lvl2pPr>
+    <a:lvl3pPr marL="914400" algn="l" defTabSz="457200" rtl="0" eaLnBrk="1" latinLnBrk="0" hangingPunct="1">
+      <a:defRPr sz="1200" kern="1200">
+        <a:solidFill>
+          <a:schemeClr val="tx1"/>
+        </a:solidFill>
+        <a:latin typeface="+mn-lt"/>
+        <a:ea typeface="+mn-ea"/>
+        <a:cs typeface="+mn-cs"/>
+      </a:defRPr>
+    </a:lvl3pPr>
+    <a:lvl4pPr marL="1371600" algn="l" defTabSz="457200" rtl="0" eaLnBrk="1" latinLnBrk="0" hangingPunct="1">
+      <a:defRPr sz="1200" kern="1200">
+        <a:solidFill>
+          <a:schemeClr val="tx1"/>
+        </a:solidFill>
+        <a:latin typeface="+mn-lt"/>
+        <a:ea typeface="+mn-ea"/>
+        <a:cs typeface="+mn-cs"/>
+      </a:defRPr>
+    </a:lvl4pPr>
+    <a:lvl5pPr marL="1828800" algn="l" defTabSz="457200" rtl="0" eaLnBrk="1" latinLnBrk="0" hangingPunct="1">
+      <a:defRPr sz="1200" kern="1200">
+        <a:solidFill>
+          <a:schemeClr val="tx1"/>
+        </a:solidFill>
+        <a:latin typeface="+mn-lt"/>
+        <a:ea typeface="+mn-ea"/>
+        <a:cs typeface="+mn-cs"/>
+      </a:defRPr>
+    </a:lvl5pPr>
+    <a:lvl6pPr marL="2286000" algn="l" defTabSz="457200" rtl="0" eaLnBrk="1" latinLnBrk="0" hangingPunct="1">
+      <a:defRPr sz="1200" kern="1200">
+        <a:solidFill>
+          <a:schemeClr val="tx1"/>
+        </a:solidFill>
+        <a:latin typeface="+mn-lt"/>
+        <a:ea typeface="+mn-ea"/>
+        <a:cs typeface="+mn-cs"/>
+      </a:defRPr>
+    </a:lvl6pPr>
+    <a:lvl7pPr marL="2743200" algn="l" defTabSz="457200" rtl="0" eaLnBrk="1" latinLnBrk="0" hangingPunct="1">
+      <a:defRPr sz="1200" kern="1200">
+        <a:solidFill>
+          <a:schemeClr val="tx1"/>
+        </a:solidFill>
+        <a:latin typeface="+mn-lt"/>
+        <a:ea typeface="+mn-ea"/>
+        <a:cs typeface="+mn-cs"/>
+      </a:defRPr>
+    </a:lvl7pPr>
+    <a:lvl8pPr marL="3200400" algn="l" defTabSz="457200" rtl="0" eaLnBrk="1" latinLnBrk="0" hangingPunct="1">
+      <a:defRPr sz="1200" kern="1200">
+        <a:solidFill>
+          <a:schemeClr val="tx1"/>
+        </a:solidFill>
+        <a:latin typeface="+mn-lt"/>
+        <a:ea typeface="+mn-ea"/>
+        <a:cs typeface="+mn-cs"/>
+      </a:defRPr>
+    </a:lvl8pPr>
+    <a:lvl9pPr marL="3657600" algn="l" defTabSz="457200" rtl="0" eaLnBrk="1" latinLnBrk="0" hangingPunct="1">
+      <a:defRPr sz="1200" kern="1200">
+        <a:solidFill>
+          <a:schemeClr val="tx1"/>
+        </a:solidFill>
+        <a:latin typeface="+mn-lt"/>
+        <a:ea typeface="+mn-ea"/>
+        <a:cs typeface="+mn-cs"/>
+      </a:defRPr>
+    </a:lvl9pPr>
+  </p:notesStyle>
 </p:notesMaster>
 </file>
 
 <file path=ppt/notesSlides/notesSlide1.xml><?xml version="1.0" encoding="utf-8"?>
-<p:notes xmlns:a="http://schemas.openxmlformats.org/drawingml/2006/main" xmlns:r="http://schemas.openxmlformats.org/officeDocument/2006/relationships" xmlns:mc="http://schemas.openxmlformats.org/markup-compatibility/2006" xmlns:mv="urn:schemas-microsoft-com:mac:vml" xmlns:p="http://schemas.openxmlformats.org/presentationml/2006/main" xmlns:c="http://schemas.openxmlformats.org/drawingml/2006/chart" xmlns:dgm="http://schemas.openxmlformats.org/drawingml/2006/diagram" xmlns:o="urn:schemas-microsoft-com:office:office" xmlns:v="urn:schemas-microsoft-com:vml" xmlns:pvml="urn:schemas-microsoft-com:office:powerpoint" xmlns:com="http://schemas.openxmlformats.org/drawingml/2006/compatibility" xmlns:p14="http://schemas.microsoft.com/office/powerpoint/2010/main" showMasterSp="0" showMasterPhAnim="0">
+<p:notes xmlns:a="http://schemas.openxmlformats.org/drawingml/2006/main" xmlns:r="http://schemas.openxmlformats.org/officeDocument/2006/relationships" xmlns:p="http://schemas.openxmlformats.org/presentationml/2006/main" showMasterSp="0" showMasterPhAnim="0">
   <p:cSld>
     <p:spTree>
       <p:nvGrpSpPr>
-        <p:cNvPr id="25" name="Shape 25"/>
+        <p:cNvPr id="1" name="Shape 25"/>
         <p:cNvGrpSpPr/>
         <p:nvPr/>
       </p:nvGrpSpPr>
       <p:grpSpPr>
         <a:xfrm>
-          <a:off y="0" x="0"/>
-          <a:ext cy="0" cx="0"/>
-          <a:chOff y="0" x="0"/>
-          <a:chExt cy="0" cx="0"/>
+          <a:off x="0" y="0"/>
+          <a:ext cx="0" cy="0"/>
+          <a:chOff x="0" y="0"/>
+          <a:chExt cx="0" cy="0"/>
         </a:xfrm>
       </p:grpSpPr>
       <p:sp>
         <p:nvSpPr>
           <p:cNvPr id="26" name="Shape 26"/>
-          <p:cNvSpPr/>
+          <p:cNvSpPr>
+            <a:spLocks noGrp="1" noRot="1" noChangeAspect="1"/>
+          </p:cNvSpPr>
           <p:nvPr>
-            <p:ph idx="2" type="sldImg"/>
+            <p:ph type="sldImg" idx="2"/>
           </p:nvPr>
         </p:nvSpPr>
         <p:spPr>
           <a:xfrm>
-            <a:off y="685800" x="381187"/>
-            <a:ext cy="3429000" cx="6096299"/>
+            <a:off x="381187" y="685800"/>
+            <a:ext cx="6096299" cy="3429000"/>
           </a:xfrm>
           <a:custGeom>
+            <a:avLst/>
+            <a:gdLst/>
+            <a:ahLst/>
+            <a:cxnLst/>
+            <a:rect l="0" t="0" r="0" b="0"/>
             <a:pathLst>
-              <a:path w="120000" extrusionOk="0" h="120000">
+              <a:path w="120000" h="120000" extrusionOk="0">
                 <a:moveTo>
-                  <a:pt y="0" x="0"/>
+                  <a:pt x="0" y="0"/>
                 </a:moveTo>
                 <a:lnTo>
-                  <a:pt y="0" x="120000"/>
+                  <a:pt x="120000" y="0"/>
                 </a:lnTo>
                 <a:lnTo>
-                  <a:pt y="120000" x="120000"/>
+                  <a:pt x="120000" y="120000"/>
                 </a:lnTo>
                 <a:lnTo>
-                  <a:pt y="120000" x="0"/>
+                  <a:pt x="0" y="120000"/>
                 </a:lnTo>
                 <a:close/>
               </a:path>
@@ -434,30 +554,32 @@
             </a:solidFill>
             <a:prstDash val="solid"/>
             <a:round/>
-            <a:headEnd w="med" len="med" type="none"/>
-            <a:tailEnd w="med" len="med" type="none"/>
+            <a:headEnd type="none" w="med" len="med"/>
+            <a:tailEnd type="none" w="med" len="med"/>
           </a:ln>
         </p:spPr>
       </p:sp>
       <p:sp>
         <p:nvSpPr>
           <p:cNvPr id="27" name="Shape 27"/>
-          <p:cNvSpPr txBox="1"/>
+          <p:cNvSpPr txBox="1">
+            <a:spLocks noGrp="1"/>
+          </p:cNvSpPr>
           <p:nvPr>
-            <p:ph idx="1" type="body"/>
+            <p:ph type="body" idx="1"/>
           </p:nvPr>
         </p:nvSpPr>
         <p:spPr>
           <a:xfrm>
-            <a:off y="4343400" x="685800"/>
-            <a:ext cy="4114800" cx="5486399"/>
+            <a:off x="685800" y="4343400"/>
+            <a:ext cx="5486399" cy="4114800"/>
           </a:xfrm>
           <a:prstGeom prst="rect">
             <a:avLst/>
           </a:prstGeom>
         </p:spPr>
         <p:txBody>
-          <a:bodyPr bIns="91425" rIns="91425" lIns="91425" tIns="91425" anchor="t" anchorCtr="0">
+          <a:bodyPr lIns="91425" tIns="91425" rIns="91425" bIns="91425" anchor="t" anchorCtr="0">
             <a:spAutoFit/>
           </a:bodyPr>
           <a:lstStyle/>
@@ -468,9 +590,6 @@
               </a:spcBef>
               <a:buNone/>
             </a:pPr>
-            <a:r>
-              <a:t/>
-            </a:r>
             <a:endParaRPr/>
           </a:p>
         </p:txBody>
@@ -484,49 +603,56 @@
 </file>
 
 <file path=ppt/notesSlides/notesSlide2.xml><?xml version="1.0" encoding="utf-8"?>
-<p:notes xmlns:a="http://schemas.openxmlformats.org/drawingml/2006/main" xmlns:r="http://schemas.openxmlformats.org/officeDocument/2006/relationships" xmlns:mc="http://schemas.openxmlformats.org/markup-compatibility/2006" xmlns:mv="urn:schemas-microsoft-com:mac:vml" xmlns:p="http://schemas.openxmlformats.org/presentationml/2006/main" xmlns:c="http://schemas.openxmlformats.org/drawingml/2006/chart" xmlns:dgm="http://schemas.openxmlformats.org/drawingml/2006/diagram" xmlns:o="urn:schemas-microsoft-com:office:office" xmlns:v="urn:schemas-microsoft-com:vml" xmlns:pvml="urn:schemas-microsoft-com:office:powerpoint" xmlns:com="http://schemas.openxmlformats.org/drawingml/2006/compatibility" xmlns:p14="http://schemas.microsoft.com/office/powerpoint/2010/main" showMasterSp="0" showMasterPhAnim="0">
+<p:notes xmlns:a="http://schemas.openxmlformats.org/drawingml/2006/main" xmlns:r="http://schemas.openxmlformats.org/officeDocument/2006/relationships" xmlns:p="http://schemas.openxmlformats.org/presentationml/2006/main" showMasterSp="0" showMasterPhAnim="0">
   <p:cSld>
     <p:spTree>
       <p:nvGrpSpPr>
-        <p:cNvPr id="32" name="Shape 32"/>
+        <p:cNvPr id="1" name="Shape 32"/>
         <p:cNvGrpSpPr/>
         <p:nvPr/>
       </p:nvGrpSpPr>
       <p:grpSpPr>
         <a:xfrm>
-          <a:off y="0" x="0"/>
-          <a:ext cy="0" cx="0"/>
-          <a:chOff y="0" x="0"/>
-          <a:chExt cy="0" cx="0"/>
+          <a:off x="0" y="0"/>
+          <a:ext cx="0" cy="0"/>
+          <a:chOff x="0" y="0"/>
+          <a:chExt cx="0" cy="0"/>
         </a:xfrm>
       </p:grpSpPr>
       <p:sp>
         <p:nvSpPr>
           <p:cNvPr id="33" name="Shape 33"/>
-          <p:cNvSpPr/>
+          <p:cNvSpPr>
+            <a:spLocks noGrp="1" noRot="1" noChangeAspect="1"/>
+          </p:cNvSpPr>
           <p:nvPr>
-            <p:ph idx="2" type="sldImg"/>
+            <p:ph type="sldImg" idx="2"/>
           </p:nvPr>
         </p:nvSpPr>
         <p:spPr>
           <a:xfrm>
-            <a:off y="685800" x="381187"/>
-            <a:ext cy="3429000" cx="6096299"/>
+            <a:off x="381000" y="685800"/>
+            <a:ext cx="6096000" cy="3429000"/>
           </a:xfrm>
           <a:custGeom>
+            <a:avLst/>
+            <a:gdLst/>
+            <a:ahLst/>
+            <a:cxnLst/>
+            <a:rect l="0" t="0" r="0" b="0"/>
             <a:pathLst>
-              <a:path w="120000" extrusionOk="0" h="120000">
+              <a:path w="120000" h="120000" extrusionOk="0">
                 <a:moveTo>
-                  <a:pt y="0" x="0"/>
+                  <a:pt x="0" y="0"/>
                 </a:moveTo>
                 <a:lnTo>
-                  <a:pt y="0" x="120000"/>
+                  <a:pt x="120000" y="0"/>
                 </a:lnTo>
                 <a:lnTo>
-                  <a:pt y="120000" x="120000"/>
+                  <a:pt x="120000" y="120000"/>
                 </a:lnTo>
                 <a:lnTo>
-                  <a:pt y="120000" x="0"/>
+                  <a:pt x="0" y="120000"/>
                 </a:lnTo>
                 <a:close/>
               </a:path>
@@ -539,30 +665,32 @@
             </a:solidFill>
             <a:prstDash val="solid"/>
             <a:round/>
-            <a:headEnd w="med" len="med" type="none"/>
-            <a:tailEnd w="med" len="med" type="none"/>
+            <a:headEnd type="none" w="med" len="med"/>
+            <a:tailEnd type="none" w="med" len="med"/>
           </a:ln>
         </p:spPr>
       </p:sp>
       <p:sp>
         <p:nvSpPr>
           <p:cNvPr id="34" name="Shape 34"/>
-          <p:cNvSpPr txBox="1"/>
+          <p:cNvSpPr txBox="1">
+            <a:spLocks noGrp="1"/>
+          </p:cNvSpPr>
           <p:nvPr>
-            <p:ph idx="1" type="body"/>
+            <p:ph type="body" idx="1"/>
           </p:nvPr>
         </p:nvSpPr>
         <p:spPr>
           <a:xfrm>
-            <a:off y="4343400" x="685800"/>
-            <a:ext cy="4114800" cx="5486399"/>
+            <a:off x="685800" y="4343400"/>
+            <a:ext cx="5486399" cy="4114800"/>
           </a:xfrm>
           <a:prstGeom prst="rect">
             <a:avLst/>
           </a:prstGeom>
         </p:spPr>
         <p:txBody>
-          <a:bodyPr bIns="91425" rIns="91425" lIns="91425" tIns="91425" anchor="t" anchorCtr="0">
+          <a:bodyPr lIns="91425" tIns="91425" rIns="91425" bIns="91425" anchor="t" anchorCtr="0">
             <a:spAutoFit/>
           </a:bodyPr>
           <a:lstStyle/>
@@ -573,9 +701,6 @@
               </a:spcBef>
               <a:buNone/>
             </a:pPr>
-            <a:r>
-              <a:t/>
-            </a:r>
             <a:endParaRPr/>
           </a:p>
         </p:txBody>
@@ -589,49 +714,56 @@
 </file>
 
 <file path=ppt/notesSlides/notesSlide3.xml><?xml version="1.0" encoding="utf-8"?>
-<p:notes xmlns:a="http://schemas.openxmlformats.org/drawingml/2006/main" xmlns:r="http://schemas.openxmlformats.org/officeDocument/2006/relationships" xmlns:mc="http://schemas.openxmlformats.org/markup-compatibility/2006" xmlns:mv="urn:schemas-microsoft-com:mac:vml" xmlns:p="http://schemas.openxmlformats.org/presentationml/2006/main" xmlns:c="http://schemas.openxmlformats.org/drawingml/2006/chart" xmlns:dgm="http://schemas.openxmlformats.org/drawingml/2006/diagram" xmlns:o="urn:schemas-microsoft-com:office:office" xmlns:v="urn:schemas-microsoft-com:vml" xmlns:pvml="urn:schemas-microsoft-com:office:powerpoint" xmlns:com="http://schemas.openxmlformats.org/drawingml/2006/compatibility" xmlns:p14="http://schemas.microsoft.com/office/powerpoint/2010/main" showMasterSp="0" showMasterPhAnim="0">
+<p:notes xmlns:a="http://schemas.openxmlformats.org/drawingml/2006/main" xmlns:r="http://schemas.openxmlformats.org/officeDocument/2006/relationships" xmlns:p="http://schemas.openxmlformats.org/presentationml/2006/main" showMasterSp="0" showMasterPhAnim="0">
   <p:cSld>
     <p:spTree>
       <p:nvGrpSpPr>
-        <p:cNvPr id="38" name="Shape 38"/>
+        <p:cNvPr id="1" name="Shape 38"/>
         <p:cNvGrpSpPr/>
         <p:nvPr/>
       </p:nvGrpSpPr>
       <p:grpSpPr>
         <a:xfrm>
-          <a:off y="0" x="0"/>
-          <a:ext cy="0" cx="0"/>
-          <a:chOff y="0" x="0"/>
-          <a:chExt cy="0" cx="0"/>
+          <a:off x="0" y="0"/>
+          <a:ext cx="0" cy="0"/>
+          <a:chOff x="0" y="0"/>
+          <a:chExt cx="0" cy="0"/>
         </a:xfrm>
       </p:grpSpPr>
       <p:sp>
         <p:nvSpPr>
           <p:cNvPr id="39" name="Shape 39"/>
-          <p:cNvSpPr/>
+          <p:cNvSpPr>
+            <a:spLocks noGrp="1" noRot="1" noChangeAspect="1"/>
+          </p:cNvSpPr>
           <p:nvPr>
-            <p:ph idx="2" type="sldImg"/>
+            <p:ph type="sldImg" idx="2"/>
           </p:nvPr>
         </p:nvSpPr>
         <p:spPr>
           <a:xfrm>
-            <a:off y="685800" x="381187"/>
-            <a:ext cy="3429000" cx="6096299"/>
+            <a:off x="381187" y="685800"/>
+            <a:ext cx="6096299" cy="3429000"/>
           </a:xfrm>
           <a:custGeom>
+            <a:avLst/>
+            <a:gdLst/>
+            <a:ahLst/>
+            <a:cxnLst/>
+            <a:rect l="0" t="0" r="0" b="0"/>
             <a:pathLst>
-              <a:path w="120000" extrusionOk="0" h="120000">
+              <a:path w="120000" h="120000" extrusionOk="0">
                 <a:moveTo>
-                  <a:pt y="0" x="0"/>
+                  <a:pt x="0" y="0"/>
                 </a:moveTo>
                 <a:lnTo>
-                  <a:pt y="0" x="120000"/>
+                  <a:pt x="120000" y="0"/>
                 </a:lnTo>
                 <a:lnTo>
-                  <a:pt y="120000" x="120000"/>
+                  <a:pt x="120000" y="120000"/>
                 </a:lnTo>
                 <a:lnTo>
-                  <a:pt y="120000" x="0"/>
+                  <a:pt x="0" y="120000"/>
                 </a:lnTo>
                 <a:close/>
               </a:path>
@@ -644,30 +776,32 @@
             </a:solidFill>
             <a:prstDash val="solid"/>
             <a:round/>
-            <a:headEnd w="med" len="med" type="none"/>
-            <a:tailEnd w="med" len="med" type="none"/>
+            <a:headEnd type="none" w="med" len="med"/>
+            <a:tailEnd type="none" w="med" len="med"/>
           </a:ln>
         </p:spPr>
       </p:sp>
       <p:sp>
         <p:nvSpPr>
           <p:cNvPr id="40" name="Shape 40"/>
-          <p:cNvSpPr txBox="1"/>
+          <p:cNvSpPr txBox="1">
+            <a:spLocks noGrp="1"/>
+          </p:cNvSpPr>
           <p:nvPr>
-            <p:ph idx="1" type="body"/>
+            <p:ph type="body" idx="1"/>
           </p:nvPr>
         </p:nvSpPr>
         <p:spPr>
           <a:xfrm>
-            <a:off y="4343400" x="685800"/>
-            <a:ext cy="4114800" cx="5486399"/>
+            <a:off x="685800" y="4343400"/>
+            <a:ext cx="5486399" cy="4114800"/>
           </a:xfrm>
           <a:prstGeom prst="rect">
             <a:avLst/>
           </a:prstGeom>
         </p:spPr>
         <p:txBody>
-          <a:bodyPr bIns="91425" rIns="91425" lIns="91425" tIns="91425" anchor="t" anchorCtr="0">
+          <a:bodyPr lIns="91425" tIns="91425" rIns="91425" bIns="91425" anchor="t" anchorCtr="0">
             <a:spAutoFit/>
           </a:bodyPr>
           <a:lstStyle/>
@@ -678,9 +812,6 @@
               </a:spcBef>
               <a:buNone/>
             </a:pPr>
-            <a:r>
-              <a:t/>
-            </a:r>
             <a:endParaRPr/>
           </a:p>
         </p:txBody>
@@ -694,49 +825,56 @@
 </file>
 
 <file path=ppt/notesSlides/notesSlide4.xml><?xml version="1.0" encoding="utf-8"?>
-<p:notes xmlns:a="http://schemas.openxmlformats.org/drawingml/2006/main" xmlns:r="http://schemas.openxmlformats.org/officeDocument/2006/relationships" xmlns:mc="http://schemas.openxmlformats.org/markup-compatibility/2006" xmlns:mv="urn:schemas-microsoft-com:mac:vml" xmlns:p="http://schemas.openxmlformats.org/presentationml/2006/main" xmlns:c="http://schemas.openxmlformats.org/drawingml/2006/chart" xmlns:dgm="http://schemas.openxmlformats.org/drawingml/2006/diagram" xmlns:o="urn:schemas-microsoft-com:office:office" xmlns:v="urn:schemas-microsoft-com:vml" xmlns:pvml="urn:schemas-microsoft-com:office:powerpoint" xmlns:com="http://schemas.openxmlformats.org/drawingml/2006/compatibility" xmlns:p14="http://schemas.microsoft.com/office/powerpoint/2010/main" showMasterSp="0" showMasterPhAnim="0">
+<p:notes xmlns:a="http://schemas.openxmlformats.org/drawingml/2006/main" xmlns:r="http://schemas.openxmlformats.org/officeDocument/2006/relationships" xmlns:p="http://schemas.openxmlformats.org/presentationml/2006/main" showMasterSp="0" showMasterPhAnim="0">
   <p:cSld>
     <p:spTree>
       <p:nvGrpSpPr>
-        <p:cNvPr id="44" name="Shape 44"/>
+        <p:cNvPr id="1" name="Shape 44"/>
         <p:cNvGrpSpPr/>
         <p:nvPr/>
       </p:nvGrpSpPr>
       <p:grpSpPr>
         <a:xfrm>
-          <a:off y="0" x="0"/>
-          <a:ext cy="0" cx="0"/>
-          <a:chOff y="0" x="0"/>
-          <a:chExt cy="0" cx="0"/>
+          <a:off x="0" y="0"/>
+          <a:ext cx="0" cy="0"/>
+          <a:chOff x="0" y="0"/>
+          <a:chExt cx="0" cy="0"/>
         </a:xfrm>
       </p:grpSpPr>
       <p:sp>
         <p:nvSpPr>
           <p:cNvPr id="45" name="Shape 45"/>
-          <p:cNvSpPr/>
+          <p:cNvSpPr>
+            <a:spLocks noGrp="1" noRot="1" noChangeAspect="1"/>
+          </p:cNvSpPr>
           <p:nvPr>
-            <p:ph idx="2" type="sldImg"/>
+            <p:ph type="sldImg" idx="2"/>
           </p:nvPr>
         </p:nvSpPr>
         <p:spPr>
           <a:xfrm>
-            <a:off y="685800" x="381187"/>
-            <a:ext cy="3429000" cx="6096299"/>
+            <a:off x="381187" y="685800"/>
+            <a:ext cx="6096299" cy="3429000"/>
           </a:xfrm>
           <a:custGeom>
+            <a:avLst/>
+            <a:gdLst/>
+            <a:ahLst/>
+            <a:cxnLst/>
+            <a:rect l="0" t="0" r="0" b="0"/>
             <a:pathLst>
-              <a:path w="120000" extrusionOk="0" h="120000">
+              <a:path w="120000" h="120000" extrusionOk="0">
                 <a:moveTo>
-                  <a:pt y="0" x="0"/>
+                  <a:pt x="0" y="0"/>
                 </a:moveTo>
                 <a:lnTo>
-                  <a:pt y="0" x="120000"/>
+                  <a:pt x="120000" y="0"/>
                 </a:lnTo>
                 <a:lnTo>
-                  <a:pt y="120000" x="120000"/>
+                  <a:pt x="120000" y="120000"/>
                 </a:lnTo>
                 <a:lnTo>
-                  <a:pt y="120000" x="0"/>
+                  <a:pt x="0" y="120000"/>
                 </a:lnTo>
                 <a:close/>
               </a:path>
@@ -749,30 +887,32 @@
             </a:solidFill>
             <a:prstDash val="solid"/>
             <a:round/>
-            <a:headEnd w="med" len="med" type="none"/>
-            <a:tailEnd w="med" len="med" type="none"/>
+            <a:headEnd type="none" w="med" len="med"/>
+            <a:tailEnd type="none" w="med" len="med"/>
           </a:ln>
         </p:spPr>
       </p:sp>
       <p:sp>
         <p:nvSpPr>
           <p:cNvPr id="46" name="Shape 46"/>
-          <p:cNvSpPr txBox="1"/>
+          <p:cNvSpPr txBox="1">
+            <a:spLocks noGrp="1"/>
+          </p:cNvSpPr>
           <p:nvPr>
-            <p:ph idx="1" type="body"/>
+            <p:ph type="body" idx="1"/>
           </p:nvPr>
         </p:nvSpPr>
         <p:spPr>
           <a:xfrm>
-            <a:off y="4343400" x="685800"/>
-            <a:ext cy="4114800" cx="5486399"/>
+            <a:off x="685800" y="4343400"/>
+            <a:ext cx="5486399" cy="4114800"/>
           </a:xfrm>
           <a:prstGeom prst="rect">
             <a:avLst/>
           </a:prstGeom>
         </p:spPr>
         <p:txBody>
-          <a:bodyPr bIns="91425" rIns="91425" lIns="91425" tIns="91425" anchor="t" anchorCtr="0">
+          <a:bodyPr lIns="91425" tIns="91425" rIns="91425" bIns="91425" anchor="t" anchorCtr="0">
             <a:spAutoFit/>
           </a:bodyPr>
           <a:lstStyle/>
@@ -783,9 +923,6 @@
               </a:spcBef>
               <a:buNone/>
             </a:pPr>
-            <a:r>
-              <a:t/>
-            </a:r>
             <a:endParaRPr/>
           </a:p>
         </p:txBody>
@@ -799,41 +936,43 @@
 </file>
 
 <file path=ppt/slideLayouts/slideLayout1.xml><?xml version="1.0" encoding="utf-8"?>
-<p:sldLayout xmlns:a="http://schemas.openxmlformats.org/drawingml/2006/main" xmlns:r="http://schemas.openxmlformats.org/officeDocument/2006/relationships" xmlns:mc="http://schemas.openxmlformats.org/markup-compatibility/2006" xmlns:mv="urn:schemas-microsoft-com:mac:vml" xmlns:p="http://schemas.openxmlformats.org/presentationml/2006/main" xmlns:c="http://schemas.openxmlformats.org/drawingml/2006/chart" xmlns:dgm="http://schemas.openxmlformats.org/drawingml/2006/diagram" xmlns:o="urn:schemas-microsoft-com:office:office" xmlns:v="urn:schemas-microsoft-com:vml" xmlns:pvml="urn:schemas-microsoft-com:office:powerpoint" xmlns:com="http://schemas.openxmlformats.org/drawingml/2006/compatibility" xmlns:p14="http://schemas.microsoft.com/office/powerpoint/2010/main" type="title">
+<p:sldLayout xmlns:a="http://schemas.openxmlformats.org/drawingml/2006/main" xmlns:r="http://schemas.openxmlformats.org/officeDocument/2006/relationships" xmlns:p="http://schemas.openxmlformats.org/presentationml/2006/main" type="title">
   <p:cSld name="Title Slide">
     <p:spTree>
       <p:nvGrpSpPr>
-        <p:cNvPr id="7" name="Shape 7"/>
+        <p:cNvPr id="1" name="Shape 7"/>
         <p:cNvGrpSpPr/>
         <p:nvPr/>
       </p:nvGrpSpPr>
       <p:grpSpPr>
         <a:xfrm>
-          <a:off y="0" x="0"/>
-          <a:ext cy="0" cx="0"/>
-          <a:chOff y="0" x="0"/>
-          <a:chExt cy="0" cx="0"/>
+          <a:off x="0" y="0"/>
+          <a:ext cx="0" cy="0"/>
+          <a:chOff x="0" y="0"/>
+          <a:chExt cx="0" cy="0"/>
         </a:xfrm>
       </p:grpSpPr>
       <p:sp>
         <p:nvSpPr>
           <p:cNvPr id="8" name="Shape 8"/>
-          <p:cNvSpPr txBox="1"/>
+          <p:cNvSpPr txBox="1">
+            <a:spLocks noGrp="1"/>
+          </p:cNvSpPr>
           <p:nvPr>
             <p:ph type="ctrTitle"/>
           </p:nvPr>
         </p:nvSpPr>
         <p:spPr>
           <a:xfrm>
-            <a:off y="1583342" x="685800"/>
-            <a:ext cy="1159799" cx="7772400"/>
+            <a:off x="685800" y="1583342"/>
+            <a:ext cx="7772400" cy="1159799"/>
           </a:xfrm>
           <a:prstGeom prst="rect">
             <a:avLst/>
           </a:prstGeom>
         </p:spPr>
         <p:txBody>
-          <a:bodyPr bIns="91425" rIns="91425" lIns="91425" tIns="91425" anchor="b" anchorCtr="0"/>
+          <a:bodyPr lIns="91425" tIns="91425" rIns="91425" bIns="91425" anchor="b" anchorCtr="0"/>
           <a:lstStyle>
             <a:lvl1pPr algn="ctr">
               <a:spcBef>
@@ -899,28 +1038,32 @@
               <a:defRPr sz="4800"/>
             </a:lvl9pPr>
           </a:lstStyle>
-          <a:p/>
+          <a:p>
+            <a:endParaRPr/>
+          </a:p>
         </p:txBody>
       </p:sp>
       <p:sp>
         <p:nvSpPr>
           <p:cNvPr id="9" name="Shape 9"/>
-          <p:cNvSpPr txBox="1"/>
+          <p:cNvSpPr txBox="1">
+            <a:spLocks noGrp="1"/>
+          </p:cNvSpPr>
           <p:nvPr>
-            <p:ph idx="1" type="subTitle"/>
+            <p:ph type="subTitle" idx="1"/>
           </p:nvPr>
         </p:nvSpPr>
         <p:spPr>
           <a:xfrm>
-            <a:off y="2840053" x="685800"/>
-            <a:ext cy="784799" cx="7772400"/>
+            <a:off x="685800" y="2840053"/>
+            <a:ext cx="7772400" cy="784799"/>
           </a:xfrm>
           <a:prstGeom prst="rect">
             <a:avLst/>
           </a:prstGeom>
         </p:spPr>
         <p:txBody>
-          <a:bodyPr bIns="91425" rIns="91425" lIns="91425" tIns="91425" anchor="t" anchorCtr="0"/>
+          <a:bodyPr lIns="91425" tIns="91425" rIns="91425" bIns="91425" anchor="t" anchorCtr="0"/>
           <a:lstStyle>
             <a:lvl1pPr algn="ctr">
               <a:spcBef>
@@ -1057,7 +1200,9 @@
               </a:defRPr>
             </a:lvl9pPr>
           </a:lstStyle>
-          <a:p/>
+          <a:p>
+            <a:endParaRPr/>
+          </a:p>
         </p:txBody>
       </p:sp>
     </p:spTree>
@@ -1069,41 +1214,43 @@
 </file>
 
 <file path=ppt/slideLayouts/slideLayout2.xml><?xml version="1.0" encoding="utf-8"?>
-<p:sldLayout xmlns:a="http://schemas.openxmlformats.org/drawingml/2006/main" xmlns:r="http://schemas.openxmlformats.org/officeDocument/2006/relationships" xmlns:mc="http://schemas.openxmlformats.org/markup-compatibility/2006" xmlns:mv="urn:schemas-microsoft-com:mac:vml" xmlns:p="http://schemas.openxmlformats.org/presentationml/2006/main" xmlns:c="http://schemas.openxmlformats.org/drawingml/2006/chart" xmlns:dgm="http://schemas.openxmlformats.org/drawingml/2006/diagram" xmlns:o="urn:schemas-microsoft-com:office:office" xmlns:v="urn:schemas-microsoft-com:vml" xmlns:pvml="urn:schemas-microsoft-com:office:powerpoint" xmlns:com="http://schemas.openxmlformats.org/drawingml/2006/compatibility" xmlns:p14="http://schemas.microsoft.com/office/powerpoint/2010/main" type="tx">
+<p:sldLayout xmlns:a="http://schemas.openxmlformats.org/drawingml/2006/main" xmlns:r="http://schemas.openxmlformats.org/officeDocument/2006/relationships" xmlns:p="http://schemas.openxmlformats.org/presentationml/2006/main" type="tx">
   <p:cSld name="Title and Body">
     <p:spTree>
       <p:nvGrpSpPr>
-        <p:cNvPr id="10" name="Shape 10"/>
+        <p:cNvPr id="1" name="Shape 10"/>
         <p:cNvGrpSpPr/>
         <p:nvPr/>
       </p:nvGrpSpPr>
       <p:grpSpPr>
         <a:xfrm>
-          <a:off y="0" x="0"/>
-          <a:ext cy="0" cx="0"/>
-          <a:chOff y="0" x="0"/>
-          <a:chExt cy="0" cx="0"/>
+          <a:off x="0" y="0"/>
+          <a:ext cx="0" cy="0"/>
+          <a:chOff x="0" y="0"/>
+          <a:chExt cx="0" cy="0"/>
         </a:xfrm>
       </p:grpSpPr>
       <p:sp>
         <p:nvSpPr>
           <p:cNvPr id="11" name="Shape 11"/>
-          <p:cNvSpPr txBox="1"/>
+          <p:cNvSpPr txBox="1">
+            <a:spLocks noGrp="1"/>
+          </p:cNvSpPr>
           <p:nvPr>
             <p:ph type="title"/>
           </p:nvPr>
         </p:nvSpPr>
         <p:spPr>
           <a:xfrm>
-            <a:off y="205978" x="457200"/>
-            <a:ext cy="857400" cx="8229600"/>
+            <a:off x="457200" y="205978"/>
+            <a:ext cx="8229600" cy="857400"/>
           </a:xfrm>
           <a:prstGeom prst="rect">
             <a:avLst/>
           </a:prstGeom>
         </p:spPr>
         <p:txBody>
-          <a:bodyPr bIns="91425" rIns="91425" lIns="91425" tIns="91425" anchor="b" anchorCtr="0"/>
+          <a:bodyPr lIns="91425" tIns="91425" rIns="91425" bIns="91425" anchor="b" anchorCtr="0"/>
           <a:lstStyle>
             <a:lvl1pPr>
               <a:spcBef>
@@ -1160,28 +1307,32 @@
               <a:defRPr/>
             </a:lvl9pPr>
           </a:lstStyle>
-          <a:p/>
+          <a:p>
+            <a:endParaRPr/>
+          </a:p>
         </p:txBody>
       </p:sp>
       <p:sp>
         <p:nvSpPr>
           <p:cNvPr id="12" name="Shape 12"/>
-          <p:cNvSpPr txBox="1"/>
+          <p:cNvSpPr txBox="1">
+            <a:spLocks noGrp="1"/>
+          </p:cNvSpPr>
           <p:nvPr>
-            <p:ph idx="1" type="body"/>
+            <p:ph type="body" idx="1"/>
           </p:nvPr>
         </p:nvSpPr>
         <p:spPr>
           <a:xfrm>
-            <a:off y="1200150" x="457200"/>
-            <a:ext cy="3725699" cx="8229600"/>
+            <a:off x="457200" y="1200150"/>
+            <a:ext cx="8229600" cy="3725699"/>
           </a:xfrm>
           <a:prstGeom prst="rect">
             <a:avLst/>
           </a:prstGeom>
         </p:spPr>
         <p:txBody>
-          <a:bodyPr bIns="91425" rIns="91425" lIns="91425" tIns="91425" anchor="t" anchorCtr="0"/>
+          <a:bodyPr lIns="91425" tIns="91425" rIns="91425" bIns="91425" anchor="t" anchorCtr="0"/>
           <a:lstStyle>
             <a:lvl1pPr>
               <a:spcBef>
@@ -1238,7 +1389,9 @@
               <a:defRPr/>
             </a:lvl9pPr>
           </a:lstStyle>
-          <a:p/>
+          <a:p>
+            <a:endParaRPr/>
+          </a:p>
         </p:txBody>
       </p:sp>
     </p:spTree>
@@ -1250,41 +1403,43 @@
 </file>
 
 <file path=ppt/slideLayouts/slideLayout3.xml><?xml version="1.0" encoding="utf-8"?>
-<p:sldLayout xmlns:a="http://schemas.openxmlformats.org/drawingml/2006/main" xmlns:r="http://schemas.openxmlformats.org/officeDocument/2006/relationships" xmlns:mc="http://schemas.openxmlformats.org/markup-compatibility/2006" xmlns:mv="urn:schemas-microsoft-com:mac:vml" xmlns:p="http://schemas.openxmlformats.org/presentationml/2006/main" xmlns:c="http://schemas.openxmlformats.org/drawingml/2006/chart" xmlns:dgm="http://schemas.openxmlformats.org/drawingml/2006/diagram" xmlns:o="urn:schemas-microsoft-com:office:office" xmlns:v="urn:schemas-microsoft-com:vml" xmlns:pvml="urn:schemas-microsoft-com:office:powerpoint" xmlns:com="http://schemas.openxmlformats.org/drawingml/2006/compatibility" xmlns:p14="http://schemas.microsoft.com/office/powerpoint/2010/main" type="twoColTx">
+<p:sldLayout xmlns:a="http://schemas.openxmlformats.org/drawingml/2006/main" xmlns:r="http://schemas.openxmlformats.org/officeDocument/2006/relationships" xmlns:p="http://schemas.openxmlformats.org/presentationml/2006/main" type="twoColTx">
   <p:cSld name="Title and Two Columns">
     <p:spTree>
       <p:nvGrpSpPr>
-        <p:cNvPr id="13" name="Shape 13"/>
+        <p:cNvPr id="1" name="Shape 13"/>
         <p:cNvGrpSpPr/>
         <p:nvPr/>
       </p:nvGrpSpPr>
       <p:grpSpPr>
         <a:xfrm>
-          <a:off y="0" x="0"/>
-          <a:ext cy="0" cx="0"/>
-          <a:chOff y="0" x="0"/>
-          <a:chExt cy="0" cx="0"/>
+          <a:off x="0" y="0"/>
+          <a:ext cx="0" cy="0"/>
+          <a:chOff x="0" y="0"/>
+          <a:chExt cx="0" cy="0"/>
         </a:xfrm>
       </p:grpSpPr>
       <p:sp>
         <p:nvSpPr>
           <p:cNvPr id="14" name="Shape 14"/>
-          <p:cNvSpPr txBox="1"/>
+          <p:cNvSpPr txBox="1">
+            <a:spLocks noGrp="1"/>
+          </p:cNvSpPr>
           <p:nvPr>
             <p:ph type="title"/>
           </p:nvPr>
         </p:nvSpPr>
         <p:spPr>
           <a:xfrm>
-            <a:off y="205978" x="457200"/>
-            <a:ext cy="857400" cx="8229600"/>
+            <a:off x="457200" y="205978"/>
+            <a:ext cx="8229600" cy="857400"/>
           </a:xfrm>
           <a:prstGeom prst="rect">
             <a:avLst/>
           </a:prstGeom>
         </p:spPr>
         <p:txBody>
-          <a:bodyPr bIns="91425" rIns="91425" lIns="91425" tIns="91425" anchor="b" anchorCtr="0"/>
+          <a:bodyPr lIns="91425" tIns="91425" rIns="91425" bIns="91425" anchor="b" anchorCtr="0"/>
           <a:lstStyle>
             <a:lvl1pPr>
               <a:spcBef>
@@ -1341,28 +1496,32 @@
               <a:defRPr/>
             </a:lvl9pPr>
           </a:lstStyle>
-          <a:p/>
+          <a:p>
+            <a:endParaRPr/>
+          </a:p>
         </p:txBody>
       </p:sp>
       <p:sp>
         <p:nvSpPr>
           <p:cNvPr id="15" name="Shape 15"/>
-          <p:cNvSpPr txBox="1"/>
+          <p:cNvSpPr txBox="1">
+            <a:spLocks noGrp="1"/>
+          </p:cNvSpPr>
           <p:nvPr>
-            <p:ph idx="1" type="body"/>
+            <p:ph type="body" idx="1"/>
           </p:nvPr>
         </p:nvSpPr>
         <p:spPr>
           <a:xfrm>
-            <a:off y="1200150" x="457200"/>
-            <a:ext cy="3725699" cx="3994500"/>
+            <a:off x="457200" y="1200150"/>
+            <a:ext cx="3994500" cy="3725699"/>
           </a:xfrm>
           <a:prstGeom prst="rect">
             <a:avLst/>
           </a:prstGeom>
         </p:spPr>
         <p:txBody>
-          <a:bodyPr bIns="91425" rIns="91425" lIns="91425" tIns="91425" anchor="t" anchorCtr="0"/>
+          <a:bodyPr lIns="91425" tIns="91425" rIns="91425" bIns="91425" anchor="t" anchorCtr="0"/>
           <a:lstStyle>
             <a:lvl1pPr>
               <a:spcBef>
@@ -1419,28 +1578,32 @@
               <a:defRPr/>
             </a:lvl9pPr>
           </a:lstStyle>
-          <a:p/>
+          <a:p>
+            <a:endParaRPr/>
+          </a:p>
         </p:txBody>
       </p:sp>
       <p:sp>
         <p:nvSpPr>
           <p:cNvPr id="16" name="Shape 16"/>
-          <p:cNvSpPr txBox="1"/>
+          <p:cNvSpPr txBox="1">
+            <a:spLocks noGrp="1"/>
+          </p:cNvSpPr>
           <p:nvPr>
-            <p:ph idx="2" type="body"/>
+            <p:ph type="body" idx="2"/>
           </p:nvPr>
         </p:nvSpPr>
         <p:spPr>
           <a:xfrm>
-            <a:off y="1200150" x="4692273"/>
-            <a:ext cy="3725699" cx="3994500"/>
+            <a:off x="4692273" y="1200150"/>
+            <a:ext cx="3994500" cy="3725699"/>
           </a:xfrm>
           <a:prstGeom prst="rect">
             <a:avLst/>
           </a:prstGeom>
         </p:spPr>
         <p:txBody>
-          <a:bodyPr bIns="91425" rIns="91425" lIns="91425" tIns="91425" anchor="t" anchorCtr="0"/>
+          <a:bodyPr lIns="91425" tIns="91425" rIns="91425" bIns="91425" anchor="t" anchorCtr="0"/>
           <a:lstStyle>
             <a:lvl1pPr>
               <a:spcBef>
@@ -1497,7 +1660,9 @@
               <a:defRPr/>
             </a:lvl9pPr>
           </a:lstStyle>
-          <a:p/>
+          <a:p>
+            <a:endParaRPr/>
+          </a:p>
         </p:txBody>
       </p:sp>
     </p:spTree>
@@ -1509,41 +1674,43 @@
 </file>
 
 <file path=ppt/slideLayouts/slideLayout4.xml><?xml version="1.0" encoding="utf-8"?>
-<p:sldLayout xmlns:a="http://schemas.openxmlformats.org/drawingml/2006/main" xmlns:r="http://schemas.openxmlformats.org/officeDocument/2006/relationships" xmlns:mc="http://schemas.openxmlformats.org/markup-compatibility/2006" xmlns:mv="urn:schemas-microsoft-com:mac:vml" xmlns:p="http://schemas.openxmlformats.org/presentationml/2006/main" xmlns:c="http://schemas.openxmlformats.org/drawingml/2006/chart" xmlns:dgm="http://schemas.openxmlformats.org/drawingml/2006/diagram" xmlns:o="urn:schemas-microsoft-com:office:office" xmlns:v="urn:schemas-microsoft-com:vml" xmlns:pvml="urn:schemas-microsoft-com:office:powerpoint" xmlns:com="http://schemas.openxmlformats.org/drawingml/2006/compatibility" xmlns:p14="http://schemas.microsoft.com/office/powerpoint/2010/main" type="titleOnly">
+<p:sldLayout xmlns:a="http://schemas.openxmlformats.org/drawingml/2006/main" xmlns:r="http://schemas.openxmlformats.org/officeDocument/2006/relationships" xmlns:p="http://schemas.openxmlformats.org/presentationml/2006/main" type="titleOnly">
   <p:cSld name="Title Only">
     <p:spTree>
       <p:nvGrpSpPr>
-        <p:cNvPr id="17" name="Shape 17"/>
+        <p:cNvPr id="1" name="Shape 17"/>
         <p:cNvGrpSpPr/>
         <p:nvPr/>
       </p:nvGrpSpPr>
       <p:grpSpPr>
         <a:xfrm>
-          <a:off y="0" x="0"/>
-          <a:ext cy="0" cx="0"/>
-          <a:chOff y="0" x="0"/>
-          <a:chExt cy="0" cx="0"/>
+          <a:off x="0" y="0"/>
+          <a:ext cx="0" cy="0"/>
+          <a:chOff x="0" y="0"/>
+          <a:chExt cx="0" cy="0"/>
         </a:xfrm>
       </p:grpSpPr>
       <p:sp>
         <p:nvSpPr>
           <p:cNvPr id="18" name="Shape 18"/>
-          <p:cNvSpPr txBox="1"/>
+          <p:cNvSpPr txBox="1">
+            <a:spLocks noGrp="1"/>
+          </p:cNvSpPr>
           <p:nvPr>
             <p:ph type="title"/>
           </p:nvPr>
         </p:nvSpPr>
         <p:spPr>
           <a:xfrm>
-            <a:off y="205978" x="457200"/>
-            <a:ext cy="857400" cx="8229600"/>
+            <a:off x="457200" y="205978"/>
+            <a:ext cx="8229600" cy="857400"/>
           </a:xfrm>
           <a:prstGeom prst="rect">
             <a:avLst/>
           </a:prstGeom>
         </p:spPr>
         <p:txBody>
-          <a:bodyPr bIns="91425" rIns="91425" lIns="91425" tIns="91425" anchor="b" anchorCtr="0"/>
+          <a:bodyPr lIns="91425" tIns="91425" rIns="91425" bIns="91425" anchor="b" anchorCtr="0"/>
           <a:lstStyle>
             <a:lvl1pPr>
               <a:spcBef>
@@ -1600,7 +1767,9 @@
               <a:defRPr/>
             </a:lvl9pPr>
           </a:lstStyle>
-          <a:p/>
+          <a:p>
+            <a:endParaRPr/>
+          </a:p>
         </p:txBody>
       </p:sp>
     </p:spTree>
@@ -1612,41 +1781,43 @@
 </file>
 
 <file path=ppt/slideLayouts/slideLayout5.xml><?xml version="1.0" encoding="utf-8"?>
-<p:sldLayout xmlns:a="http://schemas.openxmlformats.org/drawingml/2006/main" xmlns:r="http://schemas.openxmlformats.org/officeDocument/2006/relationships" xmlns:mc="http://schemas.openxmlformats.org/markup-compatibility/2006" xmlns:mv="urn:schemas-microsoft-com:mac:vml" xmlns:p="http://schemas.openxmlformats.org/presentationml/2006/main" xmlns:c="http://schemas.openxmlformats.org/drawingml/2006/chart" xmlns:dgm="http://schemas.openxmlformats.org/drawingml/2006/diagram" xmlns:o="urn:schemas-microsoft-com:office:office" xmlns:v="urn:schemas-microsoft-com:vml" xmlns:pvml="urn:schemas-microsoft-com:office:powerpoint" xmlns:com="http://schemas.openxmlformats.org/drawingml/2006/compatibility" xmlns:p14="http://schemas.microsoft.com/office/powerpoint/2010/main">
+<p:sldLayout xmlns:a="http://schemas.openxmlformats.org/drawingml/2006/main" xmlns:r="http://schemas.openxmlformats.org/officeDocument/2006/relationships" xmlns:p="http://schemas.openxmlformats.org/presentationml/2006/main">
   <p:cSld name="Caption">
     <p:spTree>
       <p:nvGrpSpPr>
-        <p:cNvPr id="19" name="Shape 19"/>
+        <p:cNvPr id="1" name="Shape 19"/>
         <p:cNvGrpSpPr/>
         <p:nvPr/>
       </p:nvGrpSpPr>
       <p:grpSpPr>
         <a:xfrm>
-          <a:off y="0" x="0"/>
-          <a:ext cy="0" cx="0"/>
-          <a:chOff y="0" x="0"/>
-          <a:chExt cy="0" cx="0"/>
+          <a:off x="0" y="0"/>
+          <a:ext cx="0" cy="0"/>
+          <a:chOff x="0" y="0"/>
+          <a:chExt cx="0" cy="0"/>
         </a:xfrm>
       </p:grpSpPr>
       <p:sp>
         <p:nvSpPr>
           <p:cNvPr id="20" name="Shape 20"/>
-          <p:cNvSpPr txBox="1"/>
+          <p:cNvSpPr txBox="1">
+            <a:spLocks noGrp="1"/>
+          </p:cNvSpPr>
           <p:nvPr>
-            <p:ph idx="1" type="body"/>
+            <p:ph type="body" idx="1"/>
           </p:nvPr>
         </p:nvSpPr>
         <p:spPr>
           <a:xfrm>
-            <a:off y="4406309" x="457200"/>
-            <a:ext cy="519599" cx="8229600"/>
+            <a:off x="457200" y="4406309"/>
+            <a:ext cx="8229600" cy="519599"/>
           </a:xfrm>
           <a:prstGeom prst="rect">
             <a:avLst/>
           </a:prstGeom>
         </p:spPr>
         <p:txBody>
-          <a:bodyPr bIns="91425" rIns="91425" lIns="91425" tIns="91425" anchor="t" anchorCtr="0"/>
+          <a:bodyPr lIns="91425" tIns="91425" rIns="91425" bIns="91425" anchor="t" anchorCtr="0"/>
           <a:lstStyle>
             <a:lvl1pPr algn="ctr">
               <a:spcBef>
@@ -1657,7 +1828,9 @@
               <a:defRPr sz="1800"/>
             </a:lvl1pPr>
           </a:lstStyle>
-          <a:p/>
+          <a:p>
+            <a:endParaRPr/>
+          </a:p>
         </p:txBody>
       </p:sp>
     </p:spTree>
@@ -1669,20 +1842,20 @@
 </file>
 
 <file path=ppt/slideLayouts/slideLayout6.xml><?xml version="1.0" encoding="utf-8"?>
-<p:sldLayout xmlns:a="http://schemas.openxmlformats.org/drawingml/2006/main" xmlns:r="http://schemas.openxmlformats.org/officeDocument/2006/relationships" xmlns:mc="http://schemas.openxmlformats.org/markup-compatibility/2006" xmlns:mv="urn:schemas-microsoft-com:mac:vml" xmlns:p="http://schemas.openxmlformats.org/presentationml/2006/main" xmlns:c="http://schemas.openxmlformats.org/drawingml/2006/chart" xmlns:dgm="http://schemas.openxmlformats.org/drawingml/2006/diagram" xmlns:o="urn:schemas-microsoft-com:office:office" xmlns:v="urn:schemas-microsoft-com:vml" xmlns:pvml="urn:schemas-microsoft-com:office:powerpoint" xmlns:com="http://schemas.openxmlformats.org/drawingml/2006/compatibility" xmlns:p14="http://schemas.microsoft.com/office/powerpoint/2010/main" type="blank">
+<p:sldLayout xmlns:a="http://schemas.openxmlformats.org/drawingml/2006/main" xmlns:r="http://schemas.openxmlformats.org/officeDocument/2006/relationships" xmlns:p="http://schemas.openxmlformats.org/presentationml/2006/main" type="blank">
   <p:cSld name="Blank">
     <p:spTree>
       <p:nvGrpSpPr>
-        <p:cNvPr id="21" name="Shape 21"/>
+        <p:cNvPr id="1" name="Shape 21"/>
         <p:cNvGrpSpPr/>
         <p:nvPr/>
       </p:nvGrpSpPr>
       <p:grpSpPr>
         <a:xfrm>
-          <a:off y="0" x="0"/>
-          <a:ext cy="0" cx="0"/>
-          <a:chOff y="0" x="0"/>
-          <a:chExt cy="0" cx="0"/>
+          <a:off x="0" y="0"/>
+          <a:ext cx="0" cy="0"/>
+          <a:chOff x="0" y="0"/>
+          <a:chExt cx="0" cy="0"/>
         </a:xfrm>
       </p:grpSpPr>
     </p:spTree>
@@ -1694,41 +1867,44 @@
 </file>
 
 <file path=ppt/slideMasters/slideMaster1.xml><?xml version="1.0" encoding="utf-8"?>
-<p:sldMaster xmlns:a="http://schemas.openxmlformats.org/drawingml/2006/main" xmlns:r="http://schemas.openxmlformats.org/officeDocument/2006/relationships" xmlns:mc="http://schemas.openxmlformats.org/markup-compatibility/2006" xmlns:mv="urn:schemas-microsoft-com:mac:vml" xmlns:p="http://schemas.openxmlformats.org/presentationml/2006/main" xmlns:c="http://schemas.openxmlformats.org/drawingml/2006/chart" xmlns:dgm="http://schemas.openxmlformats.org/drawingml/2006/diagram" xmlns:o="urn:schemas-microsoft-com:office:office" xmlns:v="urn:schemas-microsoft-com:vml" xmlns:pvml="urn:schemas-microsoft-com:office:powerpoint" xmlns:com="http://schemas.openxmlformats.org/drawingml/2006/compatibility" xmlns:p14="http://schemas.microsoft.com/office/powerpoint/2010/main">
+<p:sldMaster xmlns:a="http://schemas.openxmlformats.org/drawingml/2006/main" xmlns:r="http://schemas.openxmlformats.org/officeDocument/2006/relationships" xmlns:p="http://schemas.openxmlformats.org/presentationml/2006/main">
   <p:cSld>
     <p:bg>
       <p:bgPr>
         <a:solidFill>
           <a:schemeClr val="lt1"/>
         </a:solidFill>
+        <a:effectLst/>
       </p:bgPr>
     </p:bg>
     <p:spTree>
       <p:nvGrpSpPr>
-        <p:cNvPr id="4" name="Shape 4"/>
+        <p:cNvPr id="1" name="Shape 4"/>
         <p:cNvGrpSpPr/>
         <p:nvPr/>
       </p:nvGrpSpPr>
       <p:grpSpPr>
         <a:xfrm>
-          <a:off y="0" x="0"/>
-          <a:ext cy="0" cx="0"/>
-          <a:chOff y="0" x="0"/>
-          <a:chExt cy="0" cx="0"/>
+          <a:off x="0" y="0"/>
+          <a:ext cx="0" cy="0"/>
+          <a:chOff x="0" y="0"/>
+          <a:chExt cx="0" cy="0"/>
         </a:xfrm>
       </p:grpSpPr>
       <p:sp>
         <p:nvSpPr>
           <p:cNvPr id="5" name="Shape 5"/>
-          <p:cNvSpPr txBox="1"/>
+          <p:cNvSpPr txBox="1">
+            <a:spLocks noGrp="1"/>
+          </p:cNvSpPr>
           <p:nvPr>
             <p:ph type="title"/>
           </p:nvPr>
         </p:nvSpPr>
         <p:spPr>
           <a:xfrm>
-            <a:off y="205978" x="457200"/>
-            <a:ext cy="857400" cx="8229600"/>
+            <a:off x="457200" y="205978"/>
+            <a:ext cx="8229600" cy="857400"/>
           </a:xfrm>
           <a:prstGeom prst="rect">
             <a:avLst/>
@@ -1739,7 +1915,7 @@
           </a:ln>
         </p:spPr>
         <p:txBody>
-          <a:bodyPr bIns="91425" rIns="91425" lIns="91425" tIns="91425" anchor="b" anchorCtr="0"/>
+          <a:bodyPr lIns="91425" tIns="91425" rIns="91425" bIns="91425" anchor="b" anchorCtr="0"/>
           <a:lstStyle>
             <a:lvl1pPr>
               <a:spcBef>
@@ -1750,7 +1926,7 @@
               </a:buClr>
               <a:buSzPct val="100000"/>
               <a:buNone/>
-              <a:defRPr b="1" sz="3600">
+              <a:defRPr sz="3600" b="1">
                 <a:solidFill>
                   <a:schemeClr val="dk1"/>
                 </a:solidFill>
@@ -1765,7 +1941,7 @@
               </a:buClr>
               <a:buSzPct val="100000"/>
               <a:buNone/>
-              <a:defRPr b="1" sz="3600">
+              <a:defRPr sz="3600" b="1">
                 <a:solidFill>
                   <a:schemeClr val="dk1"/>
                 </a:solidFill>
@@ -1780,7 +1956,7 @@
               </a:buClr>
               <a:buSzPct val="100000"/>
               <a:buNone/>
-              <a:defRPr b="1" sz="3600">
+              <a:defRPr sz="3600" b="1">
                 <a:solidFill>
                   <a:schemeClr val="dk1"/>
                 </a:solidFill>
@@ -1795,7 +1971,7 @@
               </a:buClr>
               <a:buSzPct val="100000"/>
               <a:buNone/>
-              <a:defRPr b="1" sz="3600">
+              <a:defRPr sz="3600" b="1">
                 <a:solidFill>
                   <a:schemeClr val="dk1"/>
                 </a:solidFill>
@@ -1810,7 +1986,7 @@
               </a:buClr>
               <a:buSzPct val="100000"/>
               <a:buNone/>
-              <a:defRPr b="1" sz="3600">
+              <a:defRPr sz="3600" b="1">
                 <a:solidFill>
                   <a:schemeClr val="dk1"/>
                 </a:solidFill>
@@ -1825,7 +2001,7 @@
               </a:buClr>
               <a:buSzPct val="100000"/>
               <a:buNone/>
-              <a:defRPr b="1" sz="3600">
+              <a:defRPr sz="3600" b="1">
                 <a:solidFill>
                   <a:schemeClr val="dk1"/>
                 </a:solidFill>
@@ -1840,7 +2016,7 @@
               </a:buClr>
               <a:buSzPct val="100000"/>
               <a:buNone/>
-              <a:defRPr b="1" sz="3600">
+              <a:defRPr sz="3600" b="1">
                 <a:solidFill>
                   <a:schemeClr val="dk1"/>
                 </a:solidFill>
@@ -1855,7 +2031,7 @@
               </a:buClr>
               <a:buSzPct val="100000"/>
               <a:buNone/>
-              <a:defRPr b="1" sz="3600">
+              <a:defRPr sz="3600" b="1">
                 <a:solidFill>
                   <a:schemeClr val="dk1"/>
                 </a:solidFill>
@@ -1870,28 +2046,32 @@
               </a:buClr>
               <a:buSzPct val="100000"/>
               <a:buNone/>
-              <a:defRPr b="1" sz="3600">
+              <a:defRPr sz="3600" b="1">
                 <a:solidFill>
                   <a:schemeClr val="dk1"/>
                 </a:solidFill>
               </a:defRPr>
             </a:lvl9pPr>
           </a:lstStyle>
-          <a:p/>
+          <a:p>
+            <a:endParaRPr/>
+          </a:p>
         </p:txBody>
       </p:sp>
       <p:sp>
         <p:nvSpPr>
           <p:cNvPr id="6" name="Shape 6"/>
-          <p:cNvSpPr txBox="1"/>
+          <p:cNvSpPr txBox="1">
+            <a:spLocks noGrp="1"/>
+          </p:cNvSpPr>
           <p:nvPr>
-            <p:ph idx="1" type="body"/>
+            <p:ph type="body" idx="1"/>
           </p:nvPr>
         </p:nvSpPr>
         <p:spPr>
           <a:xfrm>
-            <a:off y="1200150" x="457200"/>
-            <a:ext cy="3725699" cx="8229600"/>
+            <a:off x="457200" y="1200150"/>
+            <a:ext cx="8229600" cy="3725699"/>
           </a:xfrm>
           <a:prstGeom prst="rect">
             <a:avLst/>
@@ -1902,7 +2082,7 @@
           </a:ln>
         </p:spPr>
         <p:txBody>
-          <a:bodyPr bIns="91425" rIns="91425" lIns="91425" tIns="91425" anchor="t" anchorCtr="0"/>
+          <a:bodyPr lIns="91425" tIns="91425" rIns="91425" bIns="91425" anchor="t" anchorCtr="0"/>
           <a:lstStyle>
             <a:lvl1pPr>
               <a:spcBef>
@@ -2031,12 +2211,14 @@
               </a:defRPr>
             </a:lvl9pPr>
           </a:lstStyle>
-          <a:p/>
+          <a:p>
+            <a:endParaRPr/>
+          </a:p>
         </p:txBody>
       </p:sp>
     </p:spTree>
   </p:cSld>
-  <p:clrMap accent2="accent2" accent3="accent3" accent4="accent4" accent5="accent5" accent6="accent6" hlink="hlink" tx2="lt2" tx1="dk1" bg2="dk2" bg1="lt1" folHlink="folHlink" accent1="accent1"/>
+  <p:clrMap bg1="lt1" tx1="dk1" bg2="dk2" tx2="lt2" accent1="accent1" accent2="accent2" accent3="accent3" accent4="accent4" accent5="accent5" accent6="accent6" hlink="hlink" folHlink="folHlink"/>
   <p:sldLayoutIdLst>
     <p:sldLayoutId id="2147483648" r:id="rId1"/>
     <p:sldLayoutId id="2147483649" r:id="rId2"/>
@@ -2047,7 +2229,7 @@
   </p:sldLayoutIdLst>
   <p:txStyles>
     <p:titleStyle>
-      <a:defPPr algn="l" rtl="0" marR="0">
+      <a:defPPr marR="0" algn="l" rtl="0">
         <a:lnSpc>
           <a:spcPct val="100000"/>
         </a:lnSpc>
@@ -2058,7 +2240,7 @@
           <a:spcPts val="0"/>
         </a:spcAft>
       </a:defPPr>
-      <a:lvl1pPr algn="l" rtl="0" marR="0">
+      <a:lvl1pPr marR="0" algn="l" rtl="0">
         <a:lnSpc>
           <a:spcPct val="100000"/>
         </a:lnSpc>
@@ -2069,7 +2251,7 @@
           <a:spcPts val="0"/>
         </a:spcAft>
         <a:buNone/>
-        <a:defRPr strike="noStrike" u="none" b="0" cap="none" baseline="0" sz="1400" i="0">
+        <a:defRPr sz="1400" b="0" i="0" u="none" strike="noStrike" cap="none" baseline="0">
           <a:solidFill>
             <a:srgbClr val="000000"/>
           </a:solidFill>
@@ -2080,7 +2262,7 @@
           <a:rtl val="0"/>
         </a:defRPr>
       </a:lvl1pPr>
-      <a:lvl2pPr algn="l" rtl="0" marR="0">
+      <a:lvl2pPr marR="0" algn="l" rtl="0">
         <a:lnSpc>
           <a:spcPct val="100000"/>
         </a:lnSpc>
@@ -2091,7 +2273,7 @@
           <a:spcPts val="0"/>
         </a:spcAft>
         <a:buNone/>
-        <a:defRPr strike="noStrike" u="none" b="0" cap="none" baseline="0" sz="1400" i="0">
+        <a:defRPr sz="1400" b="0" i="0" u="none" strike="noStrike" cap="none" baseline="0">
           <a:solidFill>
             <a:srgbClr val="000000"/>
           </a:solidFill>
@@ -2104,7 +2286,7 @@
       </a:lvl2pPr>
     </p:titleStyle>
     <p:bodyStyle>
-      <a:defPPr algn="l" rtl="0" marR="0">
+      <a:defPPr marR="0" algn="l" rtl="0">
         <a:lnSpc>
           <a:spcPct val="100000"/>
         </a:lnSpc>
@@ -2115,7 +2297,7 @@
           <a:spcPts val="0"/>
         </a:spcAft>
       </a:defPPr>
-      <a:lvl1pPr algn="l" rtl="0" marR="0">
+      <a:lvl1pPr marR="0" algn="l" rtl="0">
         <a:lnSpc>
           <a:spcPct val="100000"/>
         </a:lnSpc>
@@ -2126,7 +2308,7 @@
           <a:spcPts val="0"/>
         </a:spcAft>
         <a:buNone/>
-        <a:defRPr strike="noStrike" u="none" b="0" cap="none" baseline="0" sz="1400" i="0">
+        <a:defRPr sz="1400" b="0" i="0" u="none" strike="noStrike" cap="none" baseline="0">
           <a:solidFill>
             <a:srgbClr val="000000"/>
           </a:solidFill>
@@ -2137,7 +2319,7 @@
           <a:rtl val="0"/>
         </a:defRPr>
       </a:lvl1pPr>
-      <a:lvl2pPr algn="l" rtl="0" marR="0">
+      <a:lvl2pPr marR="0" algn="l" rtl="0">
         <a:lnSpc>
           <a:spcPct val="100000"/>
         </a:lnSpc>
@@ -2148,7 +2330,7 @@
           <a:spcPts val="0"/>
         </a:spcAft>
         <a:buNone/>
-        <a:defRPr strike="noStrike" u="none" b="0" cap="none" baseline="0" sz="1400" i="0">
+        <a:defRPr sz="1400" b="0" i="0" u="none" strike="noStrike" cap="none" baseline="0">
           <a:solidFill>
             <a:srgbClr val="000000"/>
           </a:solidFill>
@@ -2159,7 +2341,7 @@
           <a:rtl val="0"/>
         </a:defRPr>
       </a:lvl2pPr>
-      <a:lvl3pPr algn="l" rtl="0" marR="0">
+      <a:lvl3pPr marR="0" algn="l" rtl="0">
         <a:lnSpc>
           <a:spcPct val="100000"/>
         </a:lnSpc>
@@ -2170,7 +2352,7 @@
           <a:spcPts val="0"/>
         </a:spcAft>
         <a:buNone/>
-        <a:defRPr strike="noStrike" u="none" b="0" cap="none" baseline="0" sz="1400" i="0">
+        <a:defRPr sz="1400" b="0" i="0" u="none" strike="noStrike" cap="none" baseline="0">
           <a:solidFill>
             <a:srgbClr val="000000"/>
           </a:solidFill>
@@ -2181,7 +2363,7 @@
           <a:rtl val="0"/>
         </a:defRPr>
       </a:lvl3pPr>
-      <a:lvl4pPr algn="l" rtl="0" marR="0">
+      <a:lvl4pPr marR="0" algn="l" rtl="0">
         <a:lnSpc>
           <a:spcPct val="100000"/>
         </a:lnSpc>
@@ -2192,7 +2374,7 @@
           <a:spcPts val="0"/>
         </a:spcAft>
         <a:buNone/>
-        <a:defRPr strike="noStrike" u="none" b="0" cap="none" baseline="0" sz="1400" i="0">
+        <a:defRPr sz="1400" b="0" i="0" u="none" strike="noStrike" cap="none" baseline="0">
           <a:solidFill>
             <a:srgbClr val="000000"/>
           </a:solidFill>
@@ -2203,7 +2385,7 @@
           <a:rtl val="0"/>
         </a:defRPr>
       </a:lvl4pPr>
-      <a:lvl5pPr algn="l" rtl="0" marR="0">
+      <a:lvl5pPr marR="0" algn="l" rtl="0">
         <a:lnSpc>
           <a:spcPct val="100000"/>
         </a:lnSpc>
@@ -2214,7 +2396,7 @@
           <a:spcPts val="0"/>
         </a:spcAft>
         <a:buNone/>
-        <a:defRPr strike="noStrike" u="none" b="0" cap="none" baseline="0" sz="1400" i="0">
+        <a:defRPr sz="1400" b="0" i="0" u="none" strike="noStrike" cap="none" baseline="0">
           <a:solidFill>
             <a:srgbClr val="000000"/>
           </a:solidFill>
@@ -2225,7 +2407,7 @@
           <a:rtl val="0"/>
         </a:defRPr>
       </a:lvl5pPr>
-      <a:lvl6pPr algn="l" rtl="0" marR="0">
+      <a:lvl6pPr marR="0" algn="l" rtl="0">
         <a:lnSpc>
           <a:spcPct val="100000"/>
         </a:lnSpc>
@@ -2236,7 +2418,7 @@
           <a:spcPts val="0"/>
         </a:spcAft>
         <a:buNone/>
-        <a:defRPr strike="noStrike" u="none" b="0" cap="none" baseline="0" sz="1400" i="0">
+        <a:defRPr sz="1400" b="0" i="0" u="none" strike="noStrike" cap="none" baseline="0">
           <a:solidFill>
             <a:srgbClr val="000000"/>
           </a:solidFill>
@@ -2247,7 +2429,7 @@
           <a:rtl val="0"/>
         </a:defRPr>
       </a:lvl6pPr>
-      <a:lvl7pPr algn="l" rtl="0" marR="0">
+      <a:lvl7pPr marR="0" algn="l" rtl="0">
         <a:lnSpc>
           <a:spcPct val="100000"/>
         </a:lnSpc>
@@ -2258,7 +2440,7 @@
           <a:spcPts val="0"/>
         </a:spcAft>
         <a:buNone/>
-        <a:defRPr strike="noStrike" u="none" b="0" cap="none" baseline="0" sz="1400" i="0">
+        <a:defRPr sz="1400" b="0" i="0" u="none" strike="noStrike" cap="none" baseline="0">
           <a:solidFill>
             <a:srgbClr val="000000"/>
           </a:solidFill>
@@ -2269,7 +2451,7 @@
           <a:rtl val="0"/>
         </a:defRPr>
       </a:lvl7pPr>
-      <a:lvl8pPr algn="l" rtl="0" marR="0">
+      <a:lvl8pPr marR="0" algn="l" rtl="0">
         <a:lnSpc>
           <a:spcPct val="100000"/>
         </a:lnSpc>
@@ -2280,7 +2462,7 @@
           <a:spcPts val="0"/>
         </a:spcAft>
         <a:buNone/>
-        <a:defRPr strike="noStrike" u="none" b="0" cap="none" baseline="0" sz="1400" i="0">
+        <a:defRPr sz="1400" b="0" i="0" u="none" strike="noStrike" cap="none" baseline="0">
           <a:solidFill>
             <a:srgbClr val="000000"/>
           </a:solidFill>
@@ -2291,7 +2473,7 @@
           <a:rtl val="0"/>
         </a:defRPr>
       </a:lvl8pPr>
-      <a:lvl9pPr algn="l" rtl="0" marR="0">
+      <a:lvl9pPr marR="0" algn="l" rtl="0">
         <a:lnSpc>
           <a:spcPct val="100000"/>
         </a:lnSpc>
@@ -2302,7 +2484,7 @@
           <a:spcPts val="0"/>
         </a:spcAft>
         <a:buNone/>
-        <a:defRPr strike="noStrike" u="none" b="0" cap="none" baseline="0" sz="1400" i="0">
+        <a:defRPr sz="1400" b="0" i="0" u="none" strike="noStrike" cap="none" baseline="0">
           <a:solidFill>
             <a:srgbClr val="000000"/>
           </a:solidFill>
@@ -2315,7 +2497,7 @@
       </a:lvl9pPr>
     </p:bodyStyle>
     <p:otherStyle>
-      <a:defPPr algn="l" rtl="0" marR="0">
+      <a:defPPr marR="0" algn="l" rtl="0">
         <a:lnSpc>
           <a:spcPct val="100000"/>
         </a:lnSpc>
@@ -2326,7 +2508,7 @@
           <a:spcPts val="0"/>
         </a:spcAft>
       </a:defPPr>
-      <a:lvl1pPr algn="l" rtl="0" marR="0">
+      <a:lvl1pPr marR="0" algn="l" rtl="0">
         <a:lnSpc>
           <a:spcPct val="100000"/>
         </a:lnSpc>
@@ -2337,7 +2519,7 @@
           <a:spcPts val="0"/>
         </a:spcAft>
         <a:buNone/>
-        <a:defRPr strike="noStrike" u="none" b="0" cap="none" baseline="0" sz="1400" i="0">
+        <a:defRPr sz="1400" b="0" i="0" u="none" strike="noStrike" cap="none" baseline="0">
           <a:solidFill>
             <a:srgbClr val="000000"/>
           </a:solidFill>
@@ -2348,7 +2530,7 @@
           <a:rtl val="0"/>
         </a:defRPr>
       </a:lvl1pPr>
-      <a:lvl2pPr algn="l" rtl="0" marR="0">
+      <a:lvl2pPr marR="0" algn="l" rtl="0">
         <a:lnSpc>
           <a:spcPct val="100000"/>
         </a:lnSpc>
@@ -2359,7 +2541,7 @@
           <a:spcPts val="0"/>
         </a:spcAft>
         <a:buNone/>
-        <a:defRPr strike="noStrike" u="none" b="0" cap="none" baseline="0" sz="1400" i="0">
+        <a:defRPr sz="1400" b="0" i="0" u="none" strike="noStrike" cap="none" baseline="0">
           <a:solidFill>
             <a:srgbClr val="000000"/>
           </a:solidFill>
@@ -2370,7 +2552,7 @@
           <a:rtl val="0"/>
         </a:defRPr>
       </a:lvl2pPr>
-      <a:lvl3pPr algn="l" rtl="0" marR="0">
+      <a:lvl3pPr marR="0" algn="l" rtl="0">
         <a:lnSpc>
           <a:spcPct val="100000"/>
         </a:lnSpc>
@@ -2381,7 +2563,7 @@
           <a:spcPts val="0"/>
         </a:spcAft>
         <a:buNone/>
-        <a:defRPr strike="noStrike" u="none" b="0" cap="none" baseline="0" sz="1400" i="0">
+        <a:defRPr sz="1400" b="0" i="0" u="none" strike="noStrike" cap="none" baseline="0">
           <a:solidFill>
             <a:srgbClr val="000000"/>
           </a:solidFill>
@@ -2392,7 +2574,7 @@
           <a:rtl val="0"/>
         </a:defRPr>
       </a:lvl3pPr>
-      <a:lvl4pPr algn="l" rtl="0" marR="0">
+      <a:lvl4pPr marR="0" algn="l" rtl="0">
         <a:lnSpc>
           <a:spcPct val="100000"/>
         </a:lnSpc>
@@ -2403,7 +2585,7 @@
           <a:spcPts val="0"/>
         </a:spcAft>
         <a:buNone/>
-        <a:defRPr strike="noStrike" u="none" b="0" cap="none" baseline="0" sz="1400" i="0">
+        <a:defRPr sz="1400" b="0" i="0" u="none" strike="noStrike" cap="none" baseline="0">
           <a:solidFill>
             <a:srgbClr val="000000"/>
           </a:solidFill>
@@ -2414,7 +2596,7 @@
           <a:rtl val="0"/>
         </a:defRPr>
       </a:lvl4pPr>
-      <a:lvl5pPr algn="l" rtl="0" marR="0">
+      <a:lvl5pPr marR="0" algn="l" rtl="0">
         <a:lnSpc>
           <a:spcPct val="100000"/>
         </a:lnSpc>
@@ -2425,7 +2607,7 @@
           <a:spcPts val="0"/>
         </a:spcAft>
         <a:buNone/>
-        <a:defRPr strike="noStrike" u="none" b="0" cap="none" baseline="0" sz="1400" i="0">
+        <a:defRPr sz="1400" b="0" i="0" u="none" strike="noStrike" cap="none" baseline="0">
           <a:solidFill>
             <a:srgbClr val="000000"/>
           </a:solidFill>
@@ -2436,7 +2618,7 @@
           <a:rtl val="0"/>
         </a:defRPr>
       </a:lvl5pPr>
-      <a:lvl6pPr algn="l" rtl="0" marR="0">
+      <a:lvl6pPr marR="0" algn="l" rtl="0">
         <a:lnSpc>
           <a:spcPct val="100000"/>
         </a:lnSpc>
@@ -2447,7 +2629,7 @@
           <a:spcPts val="0"/>
         </a:spcAft>
         <a:buNone/>
-        <a:defRPr strike="noStrike" u="none" b="0" cap="none" baseline="0" sz="1400" i="0">
+        <a:defRPr sz="1400" b="0" i="0" u="none" strike="noStrike" cap="none" baseline="0">
           <a:solidFill>
             <a:srgbClr val="000000"/>
           </a:solidFill>
@@ -2458,7 +2640,7 @@
           <a:rtl val="0"/>
         </a:defRPr>
       </a:lvl6pPr>
-      <a:lvl7pPr algn="l" rtl="0" marR="0">
+      <a:lvl7pPr marR="0" algn="l" rtl="0">
         <a:lnSpc>
           <a:spcPct val="100000"/>
         </a:lnSpc>
@@ -2469,7 +2651,7 @@
           <a:spcPts val="0"/>
         </a:spcAft>
         <a:buNone/>
-        <a:defRPr strike="noStrike" u="none" b="0" cap="none" baseline="0" sz="1400" i="0">
+        <a:defRPr sz="1400" b="0" i="0" u="none" strike="noStrike" cap="none" baseline="0">
           <a:solidFill>
             <a:srgbClr val="000000"/>
           </a:solidFill>
@@ -2480,7 +2662,7 @@
           <a:rtl val="0"/>
         </a:defRPr>
       </a:lvl7pPr>
-      <a:lvl8pPr algn="l" rtl="0" marR="0">
+      <a:lvl8pPr marR="0" algn="l" rtl="0">
         <a:lnSpc>
           <a:spcPct val="100000"/>
         </a:lnSpc>
@@ -2491,7 +2673,7 @@
           <a:spcPts val="0"/>
         </a:spcAft>
         <a:buNone/>
-        <a:defRPr strike="noStrike" u="none" b="0" cap="none" baseline="0" sz="1400" i="0">
+        <a:defRPr sz="1400" b="0" i="0" u="none" strike="noStrike" cap="none" baseline="0">
           <a:solidFill>
             <a:srgbClr val="000000"/>
           </a:solidFill>
@@ -2502,7 +2684,7 @@
           <a:rtl val="0"/>
         </a:defRPr>
       </a:lvl8pPr>
-      <a:lvl9pPr algn="l" rtl="0" marR="0">
+      <a:lvl9pPr marR="0" algn="l" rtl="0">
         <a:lnSpc>
           <a:spcPct val="100000"/>
         </a:lnSpc>
@@ -2513,7 +2695,7 @@
           <a:spcPts val="0"/>
         </a:spcAft>
         <a:buNone/>
-        <a:defRPr strike="noStrike" u="none" b="0" cap="none" baseline="0" sz="1400" i="0">
+        <a:defRPr sz="1400" b="0" i="0" u="none" strike="noStrike" cap="none" baseline="0">
           <a:solidFill>
             <a:srgbClr val="000000"/>
           </a:solidFill>
@@ -2530,41 +2712,43 @@
 </file>
 
 <file path=ppt/slides/slide1.xml><?xml version="1.0" encoding="utf-8"?>
-<p:sld xmlns:a="http://schemas.openxmlformats.org/drawingml/2006/main" xmlns:r="http://schemas.openxmlformats.org/officeDocument/2006/relationships" xmlns:mc="http://schemas.openxmlformats.org/markup-compatibility/2006" xmlns:mv="urn:schemas-microsoft-com:mac:vml" xmlns:p="http://schemas.openxmlformats.org/presentationml/2006/main" xmlns:c="http://schemas.openxmlformats.org/drawingml/2006/chart" xmlns:dgm="http://schemas.openxmlformats.org/drawingml/2006/diagram" xmlns:o="urn:schemas-microsoft-com:office:office" xmlns:v="urn:schemas-microsoft-com:vml" xmlns:pvml="urn:schemas-microsoft-com:office:powerpoint" xmlns:com="http://schemas.openxmlformats.org/drawingml/2006/compatibility" xmlns:p14="http://schemas.microsoft.com/office/powerpoint/2010/main">
+<p:sld xmlns:a="http://schemas.openxmlformats.org/drawingml/2006/main" xmlns:r="http://schemas.openxmlformats.org/officeDocument/2006/relationships" xmlns:p="http://schemas.openxmlformats.org/presentationml/2006/main">
   <p:cSld>
     <p:spTree>
       <p:nvGrpSpPr>
-        <p:cNvPr id="22" name="Shape 22"/>
+        <p:cNvPr id="1" name="Shape 22"/>
         <p:cNvGrpSpPr/>
         <p:nvPr/>
       </p:nvGrpSpPr>
       <p:grpSpPr>
         <a:xfrm>
-          <a:off y="0" x="0"/>
-          <a:ext cy="0" cx="0"/>
-          <a:chOff y="0" x="0"/>
-          <a:chExt cy="0" cx="0"/>
+          <a:off x="0" y="0"/>
+          <a:ext cx="0" cy="0"/>
+          <a:chOff x="0" y="0"/>
+          <a:chExt cx="0" cy="0"/>
         </a:xfrm>
       </p:grpSpPr>
       <p:sp>
         <p:nvSpPr>
           <p:cNvPr id="23" name="Shape 23"/>
-          <p:cNvSpPr txBox="1"/>
+          <p:cNvSpPr txBox="1">
+            <a:spLocks noGrp="1"/>
+          </p:cNvSpPr>
           <p:nvPr>
             <p:ph type="ctrTitle"/>
           </p:nvPr>
         </p:nvSpPr>
         <p:spPr>
           <a:xfrm>
-            <a:off y="1583342" x="685800"/>
-            <a:ext cy="1159799" cx="7772400"/>
+            <a:off x="685800" y="1583342"/>
+            <a:ext cx="7772400" cy="1159799"/>
           </a:xfrm>
           <a:prstGeom prst="rect">
             <a:avLst/>
           </a:prstGeom>
         </p:spPr>
         <p:txBody>
-          <a:bodyPr bIns="91425" rIns="91425" lIns="91425" tIns="91425" anchor="b" anchorCtr="0">
+          <a:bodyPr lIns="91425" tIns="91425" rIns="91425" bIns="91425" anchor="b" anchorCtr="0">
             <a:spAutoFit/>
           </a:bodyPr>
           <a:lstStyle/>
@@ -2585,22 +2769,24 @@
       <p:sp>
         <p:nvSpPr>
           <p:cNvPr id="24" name="Shape 24"/>
-          <p:cNvSpPr txBox="1"/>
+          <p:cNvSpPr txBox="1">
+            <a:spLocks noGrp="1"/>
+          </p:cNvSpPr>
           <p:nvPr>
-            <p:ph idx="1" type="subTitle"/>
+            <p:ph type="subTitle" idx="1"/>
           </p:nvPr>
         </p:nvSpPr>
         <p:spPr>
           <a:xfrm>
-            <a:off y="2840053" x="685800"/>
-            <a:ext cy="784799" cx="7772400"/>
+            <a:off x="685800" y="2840053"/>
+            <a:ext cx="7772400" cy="784799"/>
           </a:xfrm>
           <a:prstGeom prst="rect">
             <a:avLst/>
           </a:prstGeom>
         </p:spPr>
         <p:txBody>
-          <a:bodyPr bIns="91425" rIns="91425" lIns="91425" tIns="91425" anchor="t" anchorCtr="0">
+          <a:bodyPr lIns="91425" tIns="91425" rIns="91425" bIns="91425" anchor="t" anchorCtr="0">
             <a:spAutoFit/>
           </a:bodyPr>
           <a:lstStyle/>
@@ -2623,53 +2809,55 @@
   <p:clrMapOvr>
     <a:masterClrMapping/>
   </p:clrMapOvr>
-  <p:transition spd="slow">
+  <p:transition xmlns:p14="http://schemas.microsoft.com/office/powerpoint/2010/main" spd="slow">
     <p:cut/>
   </p:transition>
 </p:sld>
 </file>
 
 <file path=ppt/slides/slide2.xml><?xml version="1.0" encoding="utf-8"?>
-<p:sld xmlns:a="http://schemas.openxmlformats.org/drawingml/2006/main" xmlns:r="http://schemas.openxmlformats.org/officeDocument/2006/relationships" xmlns:mc="http://schemas.openxmlformats.org/markup-compatibility/2006" xmlns:mv="urn:schemas-microsoft-com:mac:vml" xmlns:p="http://schemas.openxmlformats.org/presentationml/2006/main" xmlns:c="http://schemas.openxmlformats.org/drawingml/2006/chart" xmlns:dgm="http://schemas.openxmlformats.org/drawingml/2006/diagram" xmlns:o="urn:schemas-microsoft-com:office:office" xmlns:v="urn:schemas-microsoft-com:vml" xmlns:pvml="urn:schemas-microsoft-com:office:powerpoint" xmlns:com="http://schemas.openxmlformats.org/drawingml/2006/compatibility" xmlns:p14="http://schemas.microsoft.com/office/powerpoint/2010/main">
+<p:sld xmlns:a="http://schemas.openxmlformats.org/drawingml/2006/main" xmlns:r="http://schemas.openxmlformats.org/officeDocument/2006/relationships" xmlns:p="http://schemas.openxmlformats.org/presentationml/2006/main">
   <p:cSld>
     <p:spTree>
       <p:nvGrpSpPr>
-        <p:cNvPr id="28" name="Shape 28"/>
+        <p:cNvPr id="1" name="Shape 28"/>
         <p:cNvGrpSpPr/>
         <p:nvPr/>
       </p:nvGrpSpPr>
       <p:grpSpPr>
         <a:xfrm>
-          <a:off y="0" x="0"/>
-          <a:ext cy="0" cx="0"/>
-          <a:chOff y="0" x="0"/>
-          <a:chExt cy="0" cx="0"/>
+          <a:off x="0" y="0"/>
+          <a:ext cx="0" cy="0"/>
+          <a:chOff x="0" y="0"/>
+          <a:chExt cx="0" cy="0"/>
         </a:xfrm>
       </p:grpSpPr>
       <p:sp>
         <p:nvSpPr>
           <p:cNvPr id="29" name="Shape 29"/>
-          <p:cNvSpPr txBox="1"/>
+          <p:cNvSpPr txBox="1">
+            <a:spLocks noGrp="1"/>
+          </p:cNvSpPr>
           <p:nvPr>
             <p:ph type="title"/>
           </p:nvPr>
         </p:nvSpPr>
         <p:spPr>
           <a:xfrm>
-            <a:off y="205978" x="457200"/>
-            <a:ext cy="857400" cx="8229600"/>
+            <a:off x="457200" y="205978"/>
+            <a:ext cx="8229600" cy="857400"/>
           </a:xfrm>
           <a:prstGeom prst="rect">
             <a:avLst/>
           </a:prstGeom>
         </p:spPr>
         <p:txBody>
-          <a:bodyPr bIns="91425" rIns="91425" lIns="91425" tIns="91425" anchor="b" anchorCtr="0">
+          <a:bodyPr lIns="91425" tIns="91425" rIns="91425" bIns="91425" anchor="b" anchorCtr="0">
             <a:spAutoFit/>
           </a:bodyPr>
           <a:lstStyle/>
           <a:p>
-            <a:pPr rtl="0" lvl="0">
+            <a:pPr lvl="0" rtl="0">
               <a:spcBef>
                 <a:spcPts val="0"/>
               </a:spcBef>
@@ -2688,18 +2876,17 @@
           <p:cNvPicPr preferRelativeResize="0"/>
           <p:nvPr/>
         </p:nvPicPr>
-        <p:blipFill>
+        <p:blipFill rotWithShape="1">
           <a:blip r:embed="rId3">
             <a:alphaModFix/>
           </a:blip>
-          <a:stretch>
-            <a:fillRect/>
-          </a:stretch>
+          <a:srcRect l="16314" r="8742"/>
+          <a:stretch/>
         </p:blipFill>
         <p:spPr>
           <a:xfrm>
-            <a:off y="1377375" x="457206"/>
-            <a:ext cy="2388750" cx="2395425"/>
+            <a:off x="244240" y="1363419"/>
+            <a:ext cx="1795216" cy="2388750"/>
           </a:xfrm>
           <a:prstGeom prst="rect">
             <a:avLst/>
@@ -2718,8 +2905,8 @@
         </p:nvSpPr>
         <p:spPr>
           <a:xfrm>
-            <a:off y="3766125" x="457162"/>
-            <a:ext cy="457200" cx="2395500"/>
+            <a:off x="-48857" y="3735924"/>
+            <a:ext cx="2395500" cy="457200"/>
           </a:xfrm>
           <a:prstGeom prst="rect">
             <a:avLst/>
@@ -2730,7 +2917,7 @@
           </a:ln>
         </p:spPr>
         <p:txBody>
-          <a:bodyPr bIns="91425" rIns="91425" lIns="91425" tIns="91425" anchor="t" anchorCtr="0">
+          <a:bodyPr lIns="91425" tIns="91425" rIns="91425" bIns="91425" anchor="t" anchorCtr="0">
             <a:spAutoFit/>
           </a:bodyPr>
           <a:lstStyle/>
@@ -2742,9 +2929,146 @@
               <a:buNone/>
             </a:pPr>
             <a:r>
-              <a:rPr sz="2400" lang="en"/>
+              <a:rPr lang="en" sz="2400" dirty="0"/>
               <a:t>Daniel Epstein</a:t>
             </a:r>
+          </a:p>
+        </p:txBody>
+      </p:sp>
+      <p:pic>
+        <p:nvPicPr>
+          <p:cNvPr id="3" name="Picture 2" descr="brad_photo.png"/>
+          <p:cNvPicPr>
+            <a:picLocks noChangeAspect="1"/>
+          </p:cNvPicPr>
+          <p:nvPr/>
+        </p:nvPicPr>
+        <p:blipFill rotWithShape="1">
+          <a:blip r:embed="rId4">
+            <a:extLst>
+              <a:ext uri="{28A0092B-C50C-407E-A947-70E740481C1C}">
+                <a14:useLocalDpi xmlns:a14="http://schemas.microsoft.com/office/drawing/2010/main" val="0"/>
+              </a:ext>
+            </a:extLst>
+          </a:blip>
+          <a:srcRect l="20116" r="6005"/>
+          <a:stretch/>
+        </p:blipFill>
+        <p:spPr>
+          <a:xfrm>
+            <a:off x="3673602" y="1370397"/>
+            <a:ext cx="1795216" cy="2395728"/>
+          </a:xfrm>
+          <a:prstGeom prst="rect">
+            <a:avLst/>
+          </a:prstGeom>
+        </p:spPr>
+      </p:pic>
+      <p:pic>
+        <p:nvPicPr>
+          <p:cNvPr id="4" name="Picture 3" descr="king_photo.jpg"/>
+          <p:cNvPicPr>
+            <a:picLocks noChangeAspect="1"/>
+          </p:cNvPicPr>
+          <p:nvPr/>
+        </p:nvPicPr>
+        <p:blipFill>
+          <a:blip r:embed="rId5">
+            <a:extLst>
+              <a:ext uri="{28A0092B-C50C-407E-A947-70E740481C1C}">
+                <a14:useLocalDpi xmlns:a14="http://schemas.microsoft.com/office/drawing/2010/main" val="0"/>
+              </a:ext>
+            </a:extLst>
+          </a:blip>
+          <a:stretch>
+            <a:fillRect/>
+          </a:stretch>
+        </p:blipFill>
+        <p:spPr>
+          <a:xfrm>
+            <a:off x="7102964" y="1363419"/>
+            <a:ext cx="1796796" cy="2395728"/>
+          </a:xfrm>
+          <a:prstGeom prst="rect">
+            <a:avLst/>
+          </a:prstGeom>
+        </p:spPr>
+      </p:pic>
+      <p:sp>
+        <p:nvSpPr>
+          <p:cNvPr id="8" name="Shape 31"/>
+          <p:cNvSpPr txBox="1"/>
+          <p:nvPr/>
+        </p:nvSpPr>
+        <p:spPr>
+          <a:xfrm>
+            <a:off x="3010091" y="3735924"/>
+            <a:ext cx="3132723" cy="553968"/>
+          </a:xfrm>
+          <a:prstGeom prst="rect">
+            <a:avLst/>
+          </a:prstGeom>
+          <a:noFill/>
+          <a:ln>
+            <a:noFill/>
+          </a:ln>
+        </p:spPr>
+        <p:txBody>
+          <a:bodyPr wrap="square" lIns="91425" tIns="91425" rIns="91425" bIns="91425" anchor="t" anchorCtr="0">
+            <a:spAutoFit/>
+          </a:bodyPr>
+          <a:lstStyle/>
+          <a:p>
+            <a:pPr algn="ctr">
+              <a:spcBef>
+                <a:spcPts val="0"/>
+              </a:spcBef>
+              <a:buNone/>
+            </a:pPr>
+            <a:r>
+              <a:rPr lang="en-US" sz="2400" dirty="0" smtClean="0"/>
+              <a:t>Bradley Jacobson</a:t>
+            </a:r>
+            <a:endParaRPr lang="en" sz="2400" dirty="0"/>
+          </a:p>
+        </p:txBody>
+      </p:sp>
+      <p:sp>
+        <p:nvSpPr>
+          <p:cNvPr id="9" name="Shape 31"/>
+          <p:cNvSpPr txBox="1"/>
+          <p:nvPr/>
+        </p:nvSpPr>
+        <p:spPr>
+          <a:xfrm>
+            <a:off x="6748500" y="3735924"/>
+            <a:ext cx="2395500" cy="553968"/>
+          </a:xfrm>
+          <a:prstGeom prst="rect">
+            <a:avLst/>
+          </a:prstGeom>
+          <a:noFill/>
+          <a:ln>
+            <a:noFill/>
+          </a:ln>
+        </p:spPr>
+        <p:txBody>
+          <a:bodyPr lIns="91425" tIns="91425" rIns="91425" bIns="91425" anchor="t" anchorCtr="0">
+            <a:spAutoFit/>
+          </a:bodyPr>
+          <a:lstStyle/>
+          <a:p>
+            <a:pPr algn="ctr">
+              <a:spcBef>
+                <a:spcPts val="0"/>
+              </a:spcBef>
+              <a:buNone/>
+            </a:pPr>
+            <a:r>
+              <a:rPr lang="en-US" sz="2400" dirty="0" smtClean="0"/>
+              <a:t>King Xia</a:t>
+            </a:r>
+            <a:endParaRPr lang="en" sz="2400" dirty="0"/>
           </a:p>
         </p:txBody>
       </p:sp>
@@ -2753,48 +3077,50 @@
   <p:clrMapOvr>
     <a:masterClrMapping/>
   </p:clrMapOvr>
-  <p:transition spd="slow">
+  <p:transition xmlns:p14="http://schemas.microsoft.com/office/powerpoint/2010/main" spd="slow">
     <p:cut/>
   </p:transition>
 </p:sld>
 </file>
 
 <file path=ppt/slides/slide3.xml><?xml version="1.0" encoding="utf-8"?>
-<p:sld xmlns:a="http://schemas.openxmlformats.org/drawingml/2006/main" xmlns:r="http://schemas.openxmlformats.org/officeDocument/2006/relationships" xmlns:mc="http://schemas.openxmlformats.org/markup-compatibility/2006" xmlns:mv="urn:schemas-microsoft-com:mac:vml" xmlns:p="http://schemas.openxmlformats.org/presentationml/2006/main" xmlns:c="http://schemas.openxmlformats.org/drawingml/2006/chart" xmlns:dgm="http://schemas.openxmlformats.org/drawingml/2006/diagram" xmlns:o="urn:schemas-microsoft-com:office:office" xmlns:v="urn:schemas-microsoft-com:vml" xmlns:pvml="urn:schemas-microsoft-com:office:powerpoint" xmlns:com="http://schemas.openxmlformats.org/drawingml/2006/compatibility" xmlns:p14="http://schemas.microsoft.com/office/powerpoint/2010/main">
+<p:sld xmlns:a="http://schemas.openxmlformats.org/drawingml/2006/main" xmlns:r="http://schemas.openxmlformats.org/officeDocument/2006/relationships" xmlns:p="http://schemas.openxmlformats.org/presentationml/2006/main">
   <p:cSld>
     <p:spTree>
       <p:nvGrpSpPr>
-        <p:cNvPr id="35" name="Shape 35"/>
+        <p:cNvPr id="1" name="Shape 35"/>
         <p:cNvGrpSpPr/>
         <p:nvPr/>
       </p:nvGrpSpPr>
       <p:grpSpPr>
         <a:xfrm>
-          <a:off y="0" x="0"/>
-          <a:ext cy="0" cx="0"/>
-          <a:chOff y="0" x="0"/>
-          <a:chExt cy="0" cx="0"/>
+          <a:off x="0" y="0"/>
+          <a:ext cx="0" cy="0"/>
+          <a:chOff x="0" y="0"/>
+          <a:chExt cx="0" cy="0"/>
         </a:xfrm>
       </p:grpSpPr>
       <p:sp>
         <p:nvSpPr>
           <p:cNvPr id="36" name="Shape 36"/>
-          <p:cNvSpPr txBox="1"/>
+          <p:cNvSpPr txBox="1">
+            <a:spLocks noGrp="1"/>
+          </p:cNvSpPr>
           <p:nvPr>
             <p:ph type="title"/>
           </p:nvPr>
         </p:nvSpPr>
         <p:spPr>
           <a:xfrm>
-            <a:off y="205978" x="457200"/>
-            <a:ext cy="857400" cx="8229600"/>
+            <a:off x="457200" y="205978"/>
+            <a:ext cx="8229600" cy="857400"/>
           </a:xfrm>
           <a:prstGeom prst="rect">
             <a:avLst/>
           </a:prstGeom>
         </p:spPr>
         <p:txBody>
-          <a:bodyPr bIns="91425" rIns="91425" lIns="91425" tIns="91425" anchor="b" anchorCtr="0">
+          <a:bodyPr lIns="91425" tIns="91425" rIns="91425" bIns="91425" anchor="b" anchorCtr="0">
             <a:spAutoFit/>
           </a:bodyPr>
           <a:lstStyle/>
@@ -2815,22 +3141,24 @@
       <p:sp>
         <p:nvSpPr>
           <p:cNvPr id="37" name="Shape 37"/>
-          <p:cNvSpPr txBox="1"/>
+          <p:cNvSpPr txBox="1">
+            <a:spLocks noGrp="1"/>
+          </p:cNvSpPr>
           <p:nvPr>
-            <p:ph idx="1" type="body"/>
+            <p:ph type="body" idx="1"/>
           </p:nvPr>
         </p:nvSpPr>
         <p:spPr>
           <a:xfrm>
-            <a:off y="1200150" x="457200"/>
-            <a:ext cy="3725699" cx="8229600"/>
+            <a:off x="457200" y="1200150"/>
+            <a:ext cx="8229600" cy="3725699"/>
           </a:xfrm>
           <a:prstGeom prst="rect">
             <a:avLst/>
           </a:prstGeom>
         </p:spPr>
         <p:txBody>
-          <a:bodyPr bIns="91425" rIns="91425" lIns="91425" tIns="91425" anchor="t" anchorCtr="0">
+          <a:bodyPr lIns="91425" tIns="91425" rIns="91425" bIns="91425" anchor="t" anchorCtr="0">
             <a:spAutoFit/>
           </a:bodyPr>
           <a:lstStyle/>
@@ -2877,48 +3205,50 @@
   <p:clrMapOvr>
     <a:masterClrMapping/>
   </p:clrMapOvr>
-  <p:transition spd="slow">
+  <p:transition xmlns:p14="http://schemas.microsoft.com/office/powerpoint/2010/main" spd="slow">
     <p:cut/>
   </p:transition>
 </p:sld>
 </file>
 
 <file path=ppt/slides/slide4.xml><?xml version="1.0" encoding="utf-8"?>
-<p:sld xmlns:a="http://schemas.openxmlformats.org/drawingml/2006/main" xmlns:r="http://schemas.openxmlformats.org/officeDocument/2006/relationships" xmlns:mc="http://schemas.openxmlformats.org/markup-compatibility/2006" xmlns:mv="urn:schemas-microsoft-com:mac:vml" xmlns:p="http://schemas.openxmlformats.org/presentationml/2006/main" xmlns:c="http://schemas.openxmlformats.org/drawingml/2006/chart" xmlns:dgm="http://schemas.openxmlformats.org/drawingml/2006/diagram" xmlns:o="urn:schemas-microsoft-com:office:office" xmlns:v="urn:schemas-microsoft-com:vml" xmlns:pvml="urn:schemas-microsoft-com:office:powerpoint" xmlns:com="http://schemas.openxmlformats.org/drawingml/2006/compatibility" xmlns:p14="http://schemas.microsoft.com/office/powerpoint/2010/main">
+<p:sld xmlns:a="http://schemas.openxmlformats.org/drawingml/2006/main" xmlns:r="http://schemas.openxmlformats.org/officeDocument/2006/relationships" xmlns:p="http://schemas.openxmlformats.org/presentationml/2006/main">
   <p:cSld>
     <p:spTree>
       <p:nvGrpSpPr>
-        <p:cNvPr id="41" name="Shape 41"/>
+        <p:cNvPr id="1" name="Shape 41"/>
         <p:cNvGrpSpPr/>
         <p:nvPr/>
       </p:nvGrpSpPr>
       <p:grpSpPr>
         <a:xfrm>
-          <a:off y="0" x="0"/>
-          <a:ext cy="0" cx="0"/>
-          <a:chOff y="0" x="0"/>
-          <a:chExt cy="0" cx="0"/>
+          <a:off x="0" y="0"/>
+          <a:ext cx="0" cy="0"/>
+          <a:chOff x="0" y="0"/>
+          <a:chExt cx="0" cy="0"/>
         </a:xfrm>
       </p:grpSpPr>
       <p:sp>
         <p:nvSpPr>
           <p:cNvPr id="42" name="Shape 42"/>
-          <p:cNvSpPr txBox="1"/>
+          <p:cNvSpPr txBox="1">
+            <a:spLocks noGrp="1"/>
+          </p:cNvSpPr>
           <p:nvPr>
             <p:ph type="title"/>
           </p:nvPr>
         </p:nvSpPr>
         <p:spPr>
           <a:xfrm>
-            <a:off y="205978" x="457200"/>
-            <a:ext cy="857400" cx="8229600"/>
+            <a:off x="457200" y="205978"/>
+            <a:ext cx="8229600" cy="857400"/>
           </a:xfrm>
           <a:prstGeom prst="rect">
             <a:avLst/>
           </a:prstGeom>
         </p:spPr>
         <p:txBody>
-          <a:bodyPr bIns="91425" rIns="91425" lIns="91425" tIns="91425" anchor="b" anchorCtr="0">
+          <a:bodyPr lIns="91425" tIns="91425" rIns="91425" bIns="91425" anchor="b" anchorCtr="0">
             <a:spAutoFit/>
           </a:bodyPr>
           <a:lstStyle/>
@@ -2939,27 +3269,29 @@
       <p:sp>
         <p:nvSpPr>
           <p:cNvPr id="43" name="Shape 43"/>
-          <p:cNvSpPr txBox="1"/>
+          <p:cNvSpPr txBox="1">
+            <a:spLocks noGrp="1"/>
+          </p:cNvSpPr>
           <p:nvPr>
-            <p:ph idx="1" type="body"/>
+            <p:ph type="body" idx="1"/>
           </p:nvPr>
         </p:nvSpPr>
         <p:spPr>
           <a:xfrm>
-            <a:off y="1200150" x="457200"/>
-            <a:ext cy="3725699" cx="8229600"/>
+            <a:off x="457200" y="1200150"/>
+            <a:ext cx="8229600" cy="3725699"/>
           </a:xfrm>
           <a:prstGeom prst="rect">
             <a:avLst/>
           </a:prstGeom>
         </p:spPr>
         <p:txBody>
-          <a:bodyPr bIns="91425" rIns="91425" lIns="91425" tIns="91425" anchor="t" anchorCtr="0">
+          <a:bodyPr lIns="91425" tIns="91425" rIns="91425" bIns="91425" anchor="t" anchorCtr="0">
             <a:spAutoFit/>
           </a:bodyPr>
           <a:lstStyle/>
           <a:p>
-            <a:pPr rtl="0" lvl="0">
+            <a:pPr lvl="0" rtl="0">
               <a:spcBef>
                 <a:spcPts val="0"/>
               </a:spcBef>
@@ -2976,7 +3308,7 @@
             </a:r>
           </a:p>
           <a:p>
-            <a:pPr rtl="0" lvl="0">
+            <a:pPr lvl="0" rtl="0">
               <a:spcBef>
                 <a:spcPts val="0"/>
               </a:spcBef>
@@ -2993,7 +3325,7 @@
             </a:r>
           </a:p>
           <a:p>
-            <a:pPr rtl="0" lvl="0">
+            <a:pPr lvl="0" rtl="0">
               <a:spcBef>
                 <a:spcPts val="0"/>
               </a:spcBef>
@@ -3023,14 +3355,14 @@
   <p:clrMapOvr>
     <a:masterClrMapping/>
   </p:clrMapOvr>
-  <p:transition spd="slow">
+  <p:transition xmlns:p14="http://schemas.microsoft.com/office/powerpoint/2010/main" spd="slow">
     <p:cut/>
   </p:transition>
 </p:sld>
 </file>
 
 <file path=ppt/theme/theme1.xml><?xml version="1.0" encoding="utf-8"?>
-<a:theme xmlns:a="http://schemas.openxmlformats.org/drawingml/2006/main" xmlns:r="http://schemas.openxmlformats.org/officeDocument/2006/relationships" name="simple-light">
+<a:theme xmlns:a="http://schemas.openxmlformats.org/drawingml/2006/main" name="simple-light">
   <a:themeElements>
     <a:clrScheme name="Custom 347">
       <a:dk1>
@@ -3075,69 +3407,69 @@
         <a:latin typeface="Arial"/>
         <a:ea typeface=""/>
         <a:cs typeface=""/>
-        <a:font typeface="ＭＳ Ｐゴシック" script="Jpan"/>
-        <a:font typeface="맑은 고딕" script="Hang"/>
-        <a:font typeface="宋体" script="Hans"/>
-        <a:font typeface="新細明體" script="Hant"/>
-        <a:font typeface="Times New Roman" script="Arab"/>
-        <a:font typeface="Times New Roman" script="Hebr"/>
-        <a:font typeface="Angsana New" script="Thai"/>
-        <a:font typeface="Nyala" script="Ethi"/>
-        <a:font typeface="Vrinda" script="Beng"/>
-        <a:font typeface="Shruti" script="Gujr"/>
-        <a:font typeface="MoolBoran" script="Khmr"/>
-        <a:font typeface="Tunga" script="Knda"/>
-        <a:font typeface="Raavi" script="Guru"/>
-        <a:font typeface="Euphemia" script="Cans"/>
-        <a:font typeface="Plantagenet Cherokee" script="Cher"/>
-        <a:font typeface="Microsoft Yi Baiti" script="Yiii"/>
-        <a:font typeface="Microsoft Himalaya" script="Tibt"/>
-        <a:font typeface="MV Boli" script="Thaa"/>
-        <a:font typeface="Mangal" script="Deva"/>
-        <a:font typeface="Gautami" script="Telu"/>
-        <a:font typeface="Latha" script="Taml"/>
-        <a:font typeface="Estrangelo Edessa" script="Syrc"/>
-        <a:font typeface="Kalinga" script="Orya"/>
-        <a:font typeface="Kartika" script="Mlym"/>
-        <a:font typeface="DokChampa" script="Laoo"/>
-        <a:font typeface="Iskoola Pota" script="Sinh"/>
-        <a:font typeface="Mongolian Baiti" script="Mong"/>
-        <a:font typeface="Times New Roman" script="Viet"/>
-        <a:font typeface="Microsoft Uighur" script="Uigh"/>
+        <a:font script="Jpan" typeface="ＭＳ Ｐゴシック"/>
+        <a:font script="Hang" typeface="맑은 고딕"/>
+        <a:font script="Hans" typeface="宋体"/>
+        <a:font script="Hant" typeface="新細明體"/>
+        <a:font script="Arab" typeface="Times New Roman"/>
+        <a:font script="Hebr" typeface="Times New Roman"/>
+        <a:font script="Thai" typeface="Angsana New"/>
+        <a:font script="Ethi" typeface="Nyala"/>
+        <a:font script="Beng" typeface="Vrinda"/>
+        <a:font script="Gujr" typeface="Shruti"/>
+        <a:font script="Khmr" typeface="MoolBoran"/>
+        <a:font script="Knda" typeface="Tunga"/>
+        <a:font script="Guru" typeface="Raavi"/>
+        <a:font script="Cans" typeface="Euphemia"/>
+        <a:font script="Cher" typeface="Plantagenet Cherokee"/>
+        <a:font script="Yiii" typeface="Microsoft Yi Baiti"/>
+        <a:font script="Tibt" typeface="Microsoft Himalaya"/>
+        <a:font script="Thaa" typeface="MV Boli"/>
+        <a:font script="Deva" typeface="Mangal"/>
+        <a:font script="Telu" typeface="Gautami"/>
+        <a:font script="Taml" typeface="Latha"/>
+        <a:font script="Syrc" typeface="Estrangelo Edessa"/>
+        <a:font script="Orya" typeface="Kalinga"/>
+        <a:font script="Mlym" typeface="Kartika"/>
+        <a:font script="Laoo" typeface="DokChampa"/>
+        <a:font script="Sinh" typeface="Iskoola Pota"/>
+        <a:font script="Mong" typeface="Mongolian Baiti"/>
+        <a:font script="Viet" typeface="Times New Roman"/>
+        <a:font script="Uigh" typeface="Microsoft Uighur"/>
       </a:majorFont>
       <a:minorFont>
         <a:latin typeface="Arial"/>
         <a:ea typeface=""/>
         <a:cs typeface=""/>
-        <a:font typeface="ＭＳ Ｐゴシック" script="Jpan"/>
-        <a:font typeface="맑은 고딕" script="Hang"/>
-        <a:font typeface="宋体" script="Hans"/>
-        <a:font typeface="新細明體" script="Hant"/>
-        <a:font typeface="Times New Roman" script="Arab"/>
-        <a:font typeface="Times New Roman" script="Hebr"/>
-        <a:font typeface="Angsana New" script="Thai"/>
-        <a:font typeface="Nyala" script="Ethi"/>
-        <a:font typeface="Vrinda" script="Beng"/>
-        <a:font typeface="Shruti" script="Gujr"/>
-        <a:font typeface="MoolBoran" script="Khmr"/>
-        <a:font typeface="Tunga" script="Knda"/>
-        <a:font typeface="Raavi" script="Guru"/>
-        <a:font typeface="Euphemia" script="Cans"/>
-        <a:font typeface="Plantagenet Cherokee" script="Cher"/>
-        <a:font typeface="Microsoft Yi Baiti" script="Yiii"/>
-        <a:font typeface="Microsoft Himalaya" script="Tibt"/>
-        <a:font typeface="MV Boli" script="Thaa"/>
-        <a:font typeface="Mangal" script="Deva"/>
-        <a:font typeface="Gautami" script="Telu"/>
-        <a:font typeface="Latha" script="Taml"/>
-        <a:font typeface="Estrangelo Edessa" script="Syrc"/>
-        <a:font typeface="Kalinga" script="Orya"/>
-        <a:font typeface="Kartika" script="Mlym"/>
-        <a:font typeface="DokChampa" script="Laoo"/>
-        <a:font typeface="Iskoola Pota" script="Sinh"/>
-        <a:font typeface="Mongolian Baiti" script="Mong"/>
-        <a:font typeface="Times New Roman" script="Viet"/>
-        <a:font typeface="Microsoft Uighur" script="Uigh"/>
+        <a:font script="Jpan" typeface="ＭＳ Ｐゴシック"/>
+        <a:font script="Hang" typeface="맑은 고딕"/>
+        <a:font script="Hans" typeface="宋体"/>
+        <a:font script="Hant" typeface="新細明體"/>
+        <a:font script="Arab" typeface="Times New Roman"/>
+        <a:font script="Hebr" typeface="Times New Roman"/>
+        <a:font script="Thai" typeface="Angsana New"/>
+        <a:font script="Ethi" typeface="Nyala"/>
+        <a:font script="Beng" typeface="Vrinda"/>
+        <a:font script="Gujr" typeface="Shruti"/>
+        <a:font script="Khmr" typeface="MoolBoran"/>
+        <a:font script="Knda" typeface="Tunga"/>
+        <a:font script="Guru" typeface="Raavi"/>
+        <a:font script="Cans" typeface="Euphemia"/>
+        <a:font script="Cher" typeface="Plantagenet Cherokee"/>
+        <a:font script="Yiii" typeface="Microsoft Yi Baiti"/>
+        <a:font script="Tibt" typeface="Microsoft Himalaya"/>
+        <a:font script="Thaa" typeface="MV Boli"/>
+        <a:font script="Deva" typeface="Mangal"/>
+        <a:font script="Telu" typeface="Gautami"/>
+        <a:font script="Taml" typeface="Latha"/>
+        <a:font script="Syrc" typeface="Estrangelo Edessa"/>
+        <a:font script="Orya" typeface="Kalinga"/>
+        <a:font script="Mlym" typeface="Kartika"/>
+        <a:font script="Laoo" typeface="DokChampa"/>
+        <a:font script="Sinh" typeface="Iskoola Pota"/>
+        <a:font script="Mong" typeface="Mongolian Baiti"/>
+        <a:font script="Viet" typeface="Times New Roman"/>
+        <a:font script="Uigh" typeface="Microsoft Uighur"/>
       </a:minorFont>
     </a:fontScheme>
     <a:fmtScheme name="Office">
@@ -3189,7 +3521,7 @@
         </a:gradFill>
       </a:fillStyleLst>
       <a:lnStyleLst>
-        <a:ln w="9525" algn="ctr" cap="flat" cmpd="sng">
+        <a:ln w="9525" cap="flat" cmpd="sng" algn="ctr">
           <a:solidFill>
             <a:schemeClr val="phClr">
               <a:shade val="95000"/>
@@ -3198,13 +3530,13 @@
           </a:solidFill>
           <a:prstDash val="solid"/>
         </a:ln>
-        <a:ln w="25400" algn="ctr" cap="flat" cmpd="sng">
+        <a:ln w="25400" cap="flat" cmpd="sng" algn="ctr">
           <a:solidFill>
             <a:schemeClr val="phClr"/>
           </a:solidFill>
           <a:prstDash val="solid"/>
         </a:ln>
-        <a:ln w="38100" algn="ctr" cap="flat" cmpd="sng">
+        <a:ln w="38100" cap="flat" cmpd="sng" algn="ctr">
           <a:solidFill>
             <a:schemeClr val="phClr"/>
           </a:solidFill>
@@ -3214,7 +3546,7 @@
       <a:effectStyleLst>
         <a:effectStyle>
           <a:effectLst>
-            <a:outerShdw rotWithShape="0" dir="5400000" blurRad="40000" dist="20000">
+            <a:outerShdw blurRad="40000" dist="20000" dir="5400000" rotWithShape="0">
               <a:srgbClr val="000000">
                 <a:alpha val="38000"/>
               </a:srgbClr>
@@ -3223,7 +3555,7 @@
         </a:effectStyle>
         <a:effectStyle>
           <a:effectLst>
-            <a:outerShdw rotWithShape="0" dir="5400000" blurRad="40000" dist="23000">
+            <a:outerShdw blurRad="40000" dist="23000" dir="5400000" rotWithShape="0">
               <a:srgbClr val="000000">
                 <a:alpha val="35000"/>
               </a:srgbClr>
@@ -3232,7 +3564,7 @@
         </a:effectStyle>
         <a:effectStyle>
           <a:effectLst>
-            <a:outerShdw rotWithShape="0" dir="5400000" blurRad="40000" dist="23000">
+            <a:outerShdw blurRad="40000" dist="23000" dir="5400000" rotWithShape="0">
               <a:srgbClr val="000000">
                 <a:alpha val="35000"/>
               </a:srgbClr>
@@ -3240,10 +3572,10 @@
           </a:effectLst>
           <a:scene3d>
             <a:camera prst="orthographicFront">
-              <a:rot rev="0" lon="0" lat="0"/>
+              <a:rot lat="0" lon="0" rev="0"/>
             </a:camera>
-            <a:lightRig dir="t" rig="threePt">
-              <a:rot rev="1200000" lon="0" lat="0"/>
+            <a:lightRig rig="threePt" dir="t">
+              <a:rot lat="0" lon="0" rev="1200000"/>
             </a:lightRig>
           </a:scene3d>
           <a:sp3d>
@@ -3278,7 +3610,7 @@
             </a:gs>
           </a:gsLst>
           <a:path path="circle">
-            <a:fillToRect t="-80000" b="180000" r="50000" l="50000"/>
+            <a:fillToRect l="50000" t="-80000" r="50000" b="180000"/>
           </a:path>
         </a:gradFill>
         <a:gradFill rotWithShape="1">
@@ -3297,54 +3629,56 @@
             </a:gs>
           </a:gsLst>
           <a:path path="circle">
-            <a:fillToRect t="50000" b="50000" r="50000" l="50000"/>
+            <a:fillToRect l="50000" t="50000" r="50000" b="50000"/>
           </a:path>
         </a:gradFill>
       </a:bgFillStyleLst>
     </a:fmtScheme>
   </a:themeElements>
+  <a:objectDefaults/>
+  <a:extraClrSchemeLst/>
 </a:theme>
 </file>
 
 <file path=ppt/theme/theme2.xml><?xml version="1.0" encoding="utf-8"?>
-<a:theme xmlns:a="http://schemas.openxmlformats.org/drawingml/2006/main" xmlns:r="http://schemas.openxmlformats.org/officeDocument/2006/relationships" name="Office Theme">
+<a:theme xmlns:a="http://schemas.openxmlformats.org/drawingml/2006/main" name="Custom Theme">
   <a:themeElements>
-    <a:clrScheme name="Office">
+    <a:clrScheme name="Default">
       <a:dk1>
-        <a:sysClr val="windowText" lastClr="000000"/>
+        <a:srgbClr val="000000"/>
       </a:dk1>
       <a:lt1>
-        <a:sysClr val="window" lastClr="FFFFFF"/>
+        <a:srgbClr val="FFFFFF"/>
       </a:lt1>
       <a:dk2>
-        <a:srgbClr val="1F497D"/>
+        <a:srgbClr val="158158"/>
       </a:dk2>
       <a:lt2>
-        <a:srgbClr val="EEECE1"/>
+        <a:srgbClr val="F3F3F3"/>
       </a:lt2>
       <a:accent1>
-        <a:srgbClr val="4F81BD"/>
+        <a:srgbClr val="058DC7"/>
       </a:accent1>
       <a:accent2>
-        <a:srgbClr val="C0504D"/>
+        <a:srgbClr val="50B432"/>
       </a:accent2>
       <a:accent3>
-        <a:srgbClr val="9BBB59"/>
+        <a:srgbClr val="ED561B"/>
       </a:accent3>
       <a:accent4>
-        <a:srgbClr val="8064A2"/>
+        <a:srgbClr val="EDEF00"/>
       </a:accent4>
       <a:accent5>
-        <a:srgbClr val="4BACC6"/>
+        <a:srgbClr val="24CBE5"/>
       </a:accent5>
       <a:accent6>
-        <a:srgbClr val="F79646"/>
+        <a:srgbClr val="64E572"/>
       </a:accent6>
       <a:hlink>
-        <a:srgbClr val="0000FF"/>
+        <a:srgbClr val="2200CC"/>
       </a:hlink>
       <a:folHlink>
-        <a:srgbClr val="800080"/>
+        <a:srgbClr val="551A8B"/>
       </a:folHlink>
     </a:clrScheme>
     <a:fontScheme name="Office">
@@ -3352,69 +3686,69 @@
         <a:latin typeface="Arial"/>
         <a:ea typeface=""/>
         <a:cs typeface=""/>
-        <a:font typeface="ＭＳ Ｐゴシック" script="Jpan"/>
-        <a:font typeface="맑은 고딕" script="Hang"/>
-        <a:font typeface="宋体" script="Hans"/>
-        <a:font typeface="新細明體" script="Hant"/>
-        <a:font typeface="Times New Roman" script="Arab"/>
-        <a:font typeface="Times New Roman" script="Hebr"/>
-        <a:font typeface="Angsana New" script="Thai"/>
-        <a:font typeface="Nyala" script="Ethi"/>
-        <a:font typeface="Vrinda" script="Beng"/>
-        <a:font typeface="Shruti" script="Gujr"/>
-        <a:font typeface="MoolBoran" script="Khmr"/>
-        <a:font typeface="Tunga" script="Knda"/>
-        <a:font typeface="Raavi" script="Guru"/>
-        <a:font typeface="Euphemia" script="Cans"/>
-        <a:font typeface="Plantagenet Cherokee" script="Cher"/>
-        <a:font typeface="Microsoft Yi Baiti" script="Yiii"/>
-        <a:font typeface="Microsoft Himalaya" script="Tibt"/>
-        <a:font typeface="MV Boli" script="Thaa"/>
-        <a:font typeface="Mangal" script="Deva"/>
-        <a:font typeface="Gautami" script="Telu"/>
-        <a:font typeface="Latha" script="Taml"/>
-        <a:font typeface="Estrangelo Edessa" script="Syrc"/>
-        <a:font typeface="Kalinga" script="Orya"/>
-        <a:font typeface="Kartika" script="Mlym"/>
-        <a:font typeface="DokChampa" script="Laoo"/>
-        <a:font typeface="Iskoola Pota" script="Sinh"/>
-        <a:font typeface="Mongolian Baiti" script="Mong"/>
-        <a:font typeface="Times New Roman" script="Viet"/>
-        <a:font typeface="Microsoft Uighur" script="Uigh"/>
+        <a:font script="Jpan" typeface="ＭＳ Ｐゴシック"/>
+        <a:font script="Hang" typeface="맑은 고딕"/>
+        <a:font script="Hans" typeface="宋体"/>
+        <a:font script="Hant" typeface="新細明體"/>
+        <a:font script="Arab" typeface="Times New Roman"/>
+        <a:font script="Hebr" typeface="Times New Roman"/>
+        <a:font script="Thai" typeface="Angsana New"/>
+        <a:font script="Ethi" typeface="Nyala"/>
+        <a:font script="Beng" typeface="Vrinda"/>
+        <a:font script="Gujr" typeface="Shruti"/>
+        <a:font script="Khmr" typeface="MoolBoran"/>
+        <a:font script="Knda" typeface="Tunga"/>
+        <a:font script="Guru" typeface="Raavi"/>
+        <a:font script="Cans" typeface="Euphemia"/>
+        <a:font script="Cher" typeface="Plantagenet Cherokee"/>
+        <a:font script="Yiii" typeface="Microsoft Yi Baiti"/>
+        <a:font script="Tibt" typeface="Microsoft Himalaya"/>
+        <a:font script="Thaa" typeface="MV Boli"/>
+        <a:font script="Deva" typeface="Mangal"/>
+        <a:font script="Telu" typeface="Gautami"/>
+        <a:font script="Taml" typeface="Latha"/>
+        <a:font script="Syrc" typeface="Estrangelo Edessa"/>
+        <a:font script="Orya" typeface="Kalinga"/>
+        <a:font script="Mlym" typeface="Kartika"/>
+        <a:font script="Laoo" typeface="DokChampa"/>
+        <a:font script="Sinh" typeface="Iskoola Pota"/>
+        <a:font script="Mong" typeface="Mongolian Baiti"/>
+        <a:font script="Viet" typeface="Times New Roman"/>
+        <a:font script="Uigh" typeface="Microsoft Uighur"/>
       </a:majorFont>
       <a:minorFont>
         <a:latin typeface="Arial"/>
         <a:ea typeface=""/>
         <a:cs typeface=""/>
-        <a:font typeface="ＭＳ Ｐゴシック" script="Jpan"/>
-        <a:font typeface="맑은 고딕" script="Hang"/>
-        <a:font typeface="宋体" script="Hans"/>
-        <a:font typeface="新細明體" script="Hant"/>
-        <a:font typeface="Times New Roman" script="Arab"/>
-        <a:font typeface="Times New Roman" script="Hebr"/>
-        <a:font typeface="Angsana New" script="Thai"/>
-        <a:font typeface="Nyala" script="Ethi"/>
-        <a:font typeface="Vrinda" script="Beng"/>
-        <a:font typeface="Shruti" script="Gujr"/>
-        <a:font typeface="MoolBoran" script="Khmr"/>
-        <a:font typeface="Tunga" script="Knda"/>
-        <a:font typeface="Raavi" script="Guru"/>
-        <a:font typeface="Euphemia" script="Cans"/>
-        <a:font typeface="Plantagenet Cherokee" script="Cher"/>
-        <a:font typeface="Microsoft Yi Baiti" script="Yiii"/>
-        <a:font typeface="Microsoft Himalaya" script="Tibt"/>
-        <a:font typeface="MV Boli" script="Thaa"/>
-        <a:font typeface="Mangal" script="Deva"/>
-        <a:font typeface="Gautami" script="Telu"/>
-        <a:font typeface="Latha" script="Taml"/>
-        <a:font typeface="Estrangelo Edessa" script="Syrc"/>
-        <a:font typeface="Kalinga" script="Orya"/>
-        <a:font typeface="Kartika" script="Mlym"/>
-        <a:font typeface="DokChampa" script="Laoo"/>
-        <a:font typeface="Iskoola Pota" script="Sinh"/>
-        <a:font typeface="Mongolian Baiti" script="Mong"/>
-        <a:font typeface="Times New Roman" script="Viet"/>
-        <a:font typeface="Microsoft Uighur" script="Uigh"/>
+        <a:font script="Jpan" typeface="ＭＳ Ｐゴシック"/>
+        <a:font script="Hang" typeface="맑은 고딕"/>
+        <a:font script="Hans" typeface="宋体"/>
+        <a:font script="Hant" typeface="新細明體"/>
+        <a:font script="Arab" typeface="Times New Roman"/>
+        <a:font script="Hebr" typeface="Times New Roman"/>
+        <a:font script="Thai" typeface="Angsana New"/>
+        <a:font script="Ethi" typeface="Nyala"/>
+        <a:font script="Beng" typeface="Vrinda"/>
+        <a:font script="Gujr" typeface="Shruti"/>
+        <a:font script="Khmr" typeface="MoolBoran"/>
+        <a:font script="Knda" typeface="Tunga"/>
+        <a:font script="Guru" typeface="Raavi"/>
+        <a:font script="Cans" typeface="Euphemia"/>
+        <a:font script="Cher" typeface="Plantagenet Cherokee"/>
+        <a:font script="Yiii" typeface="Microsoft Yi Baiti"/>
+        <a:font script="Tibt" typeface="Microsoft Himalaya"/>
+        <a:font script="Thaa" typeface="MV Boli"/>
+        <a:font script="Deva" typeface="Mangal"/>
+        <a:font script="Telu" typeface="Gautami"/>
+        <a:font script="Taml" typeface="Latha"/>
+        <a:font script="Syrc" typeface="Estrangelo Edessa"/>
+        <a:font script="Orya" typeface="Kalinga"/>
+        <a:font script="Mlym" typeface="Kartika"/>
+        <a:font script="Laoo" typeface="DokChampa"/>
+        <a:font script="Sinh" typeface="Iskoola Pota"/>
+        <a:font script="Mong" typeface="Mongolian Baiti"/>
+        <a:font script="Viet" typeface="Times New Roman"/>
+        <a:font script="Uigh" typeface="Microsoft Uighur"/>
       </a:minorFont>
     </a:fontScheme>
     <a:fmtScheme name="Office">
@@ -3466,7 +3800,7 @@
         </a:gradFill>
       </a:fillStyleLst>
       <a:lnStyleLst>
-        <a:ln w="9525" algn="ctr" cap="flat" cmpd="sng">
+        <a:ln w="9525" cap="flat" cmpd="sng" algn="ctr">
           <a:solidFill>
             <a:schemeClr val="phClr">
               <a:shade val="95000"/>
@@ -3475,13 +3809,13 @@
           </a:solidFill>
           <a:prstDash val="solid"/>
         </a:ln>
-        <a:ln w="25400" algn="ctr" cap="flat" cmpd="sng">
+        <a:ln w="25400" cap="flat" cmpd="sng" algn="ctr">
           <a:solidFill>
             <a:schemeClr val="phClr"/>
           </a:solidFill>
           <a:prstDash val="solid"/>
         </a:ln>
-        <a:ln w="38100" algn="ctr" cap="flat" cmpd="sng">
+        <a:ln w="38100" cap="flat" cmpd="sng" algn="ctr">
           <a:solidFill>
             <a:schemeClr val="phClr"/>
           </a:solidFill>
@@ -3491,7 +3825,7 @@
       <a:effectStyleLst>
         <a:effectStyle>
           <a:effectLst>
-            <a:outerShdw rotWithShape="0" dir="5400000" blurRad="40000" dist="20000">
+            <a:outerShdw blurRad="40000" dist="20000" dir="5400000" rotWithShape="0">
               <a:srgbClr val="000000">
                 <a:alpha val="38000"/>
               </a:srgbClr>
@@ -3500,7 +3834,7 @@
         </a:effectStyle>
         <a:effectStyle>
           <a:effectLst>
-            <a:outerShdw rotWithShape="0" dir="5400000" blurRad="40000" dist="23000">
+            <a:outerShdw blurRad="40000" dist="23000" dir="5400000" rotWithShape="0">
               <a:srgbClr val="000000">
                 <a:alpha val="35000"/>
               </a:srgbClr>
@@ -3509,7 +3843,7 @@
         </a:effectStyle>
         <a:effectStyle>
           <a:effectLst>
-            <a:outerShdw rotWithShape="0" dir="5400000" blurRad="40000" dist="23000">
+            <a:outerShdw blurRad="40000" dist="23000" dir="5400000" rotWithShape="0">
               <a:srgbClr val="000000">
                 <a:alpha val="35000"/>
               </a:srgbClr>
@@ -3517,10 +3851,10 @@
           </a:effectLst>
           <a:scene3d>
             <a:camera prst="orthographicFront">
-              <a:rot rev="0" lon="0" lat="0"/>
+              <a:rot lat="0" lon="0" rev="0"/>
             </a:camera>
-            <a:lightRig dir="t" rig="threePt">
-              <a:rot rev="1200000" lon="0" lat="0"/>
+            <a:lightRig rig="threePt" dir="t">
+              <a:rot lat="0" lon="0" rev="1200000"/>
             </a:lightRig>
           </a:scene3d>
           <a:sp3d>
@@ -3555,7 +3889,7 @@
             </a:gs>
           </a:gsLst>
           <a:path path="circle">
-            <a:fillToRect t="-80000" b="180000" r="50000" l="50000"/>
+            <a:fillToRect l="50000" t="-80000" r="50000" b="180000"/>
           </a:path>
         </a:gradFill>
         <a:gradFill rotWithShape="1">
@@ -3574,328 +3908,13 @@
             </a:gs>
           </a:gsLst>
           <a:path path="circle">
-            <a:fillToRect t="50000" b="50000" r="50000" l="50000"/>
+            <a:fillToRect l="50000" t="50000" r="50000" b="50000"/>
           </a:path>
         </a:gradFill>
       </a:bgFillStyleLst>
     </a:fmtScheme>
   </a:themeElements>
-  <a:objectDefaults>
-    <a:spDef>
-      <a:spPr/>
-      <a:bodyPr/>
-      <a:lstStyle/>
-      <a:style>
-        <a:lnRef idx="1">
-          <a:schemeClr val="accent1"/>
-        </a:lnRef>
-        <a:fillRef idx="3">
-          <a:schemeClr val="accent1"/>
-        </a:fillRef>
-        <a:effectRef idx="2">
-          <a:schemeClr val="accent1"/>
-        </a:effectRef>
-        <a:fontRef idx="minor">
-          <a:schemeClr val="lt1"/>
-        </a:fontRef>
-      </a:style>
-    </a:spDef>
-    <a:lnDef>
-      <a:spPr/>
-      <a:bodyPr/>
-      <a:lstStyle/>
-      <a:style>
-        <a:lnRef idx="2">
-          <a:schemeClr val="accent1"/>
-        </a:lnRef>
-        <a:fillRef idx="0">
-          <a:schemeClr val="accent1"/>
-        </a:fillRef>
-        <a:effectRef idx="1">
-          <a:schemeClr val="accent1"/>
-        </a:effectRef>
-        <a:fontRef idx="minor">
-          <a:schemeClr val="tx1"/>
-        </a:fontRef>
-      </a:style>
-    </a:lnDef>
-  </a:objectDefaults>
-</a:theme>
-</file>
-
-<file path=ppt/theme/theme3.xml><?xml version="1.0" encoding="utf-8"?>
-<a:theme xmlns:a="http://schemas.openxmlformats.org/drawingml/2006/main" xmlns:r="http://schemas.openxmlformats.org/officeDocument/2006/relationships" name="Custom Theme">
-  <a:themeElements>
-    <a:clrScheme name="Default">
-      <a:dk1>
-        <a:srgbClr val="000000"/>
-      </a:dk1>
-      <a:lt1>
-        <a:srgbClr val="FFFFFF"/>
-      </a:lt1>
-      <a:dk2>
-        <a:srgbClr val="158158"/>
-      </a:dk2>
-      <a:lt2>
-        <a:srgbClr val="F3F3F3"/>
-      </a:lt2>
-      <a:accent1>
-        <a:srgbClr val="058DC7"/>
-      </a:accent1>
-      <a:accent2>
-        <a:srgbClr val="50B432"/>
-      </a:accent2>
-      <a:accent3>
-        <a:srgbClr val="ED561B"/>
-      </a:accent3>
-      <a:accent4>
-        <a:srgbClr val="EDEF00"/>
-      </a:accent4>
-      <a:accent5>
-        <a:srgbClr val="24CBE5"/>
-      </a:accent5>
-      <a:accent6>
-        <a:srgbClr val="64E572"/>
-      </a:accent6>
-      <a:hlink>
-        <a:srgbClr val="2200CC"/>
-      </a:hlink>
-      <a:folHlink>
-        <a:srgbClr val="551A8B"/>
-      </a:folHlink>
-    </a:clrScheme>
-    <a:fontScheme name="Office">
-      <a:majorFont>
-        <a:latin typeface="Arial"/>
-        <a:ea typeface=""/>
-        <a:cs typeface=""/>
-        <a:font typeface="ＭＳ Ｐゴシック" script="Jpan"/>
-        <a:font typeface="맑은 고딕" script="Hang"/>
-        <a:font typeface="宋体" script="Hans"/>
-        <a:font typeface="新細明體" script="Hant"/>
-        <a:font typeface="Times New Roman" script="Arab"/>
-        <a:font typeface="Times New Roman" script="Hebr"/>
-        <a:font typeface="Angsana New" script="Thai"/>
-        <a:font typeface="Nyala" script="Ethi"/>
-        <a:font typeface="Vrinda" script="Beng"/>
-        <a:font typeface="Shruti" script="Gujr"/>
-        <a:font typeface="MoolBoran" script="Khmr"/>
-        <a:font typeface="Tunga" script="Knda"/>
-        <a:font typeface="Raavi" script="Guru"/>
-        <a:font typeface="Euphemia" script="Cans"/>
-        <a:font typeface="Plantagenet Cherokee" script="Cher"/>
-        <a:font typeface="Microsoft Yi Baiti" script="Yiii"/>
-        <a:font typeface="Microsoft Himalaya" script="Tibt"/>
-        <a:font typeface="MV Boli" script="Thaa"/>
-        <a:font typeface="Mangal" script="Deva"/>
-        <a:font typeface="Gautami" script="Telu"/>
-        <a:font typeface="Latha" script="Taml"/>
-        <a:font typeface="Estrangelo Edessa" script="Syrc"/>
-        <a:font typeface="Kalinga" script="Orya"/>
-        <a:font typeface="Kartika" script="Mlym"/>
-        <a:font typeface="DokChampa" script="Laoo"/>
-        <a:font typeface="Iskoola Pota" script="Sinh"/>
-        <a:font typeface="Mongolian Baiti" script="Mong"/>
-        <a:font typeface="Times New Roman" script="Viet"/>
-        <a:font typeface="Microsoft Uighur" script="Uigh"/>
-      </a:majorFont>
-      <a:minorFont>
-        <a:latin typeface="Arial"/>
-        <a:ea typeface=""/>
-        <a:cs typeface=""/>
-        <a:font typeface="ＭＳ Ｐゴシック" script="Jpan"/>
-        <a:font typeface="맑은 고딕" script="Hang"/>
-        <a:font typeface="宋体" script="Hans"/>
-        <a:font typeface="新細明體" script="Hant"/>
-        <a:font typeface="Times New Roman" script="Arab"/>
-        <a:font typeface="Times New Roman" script="Hebr"/>
-        <a:font typeface="Angsana New" script="Thai"/>
-        <a:font typeface="Nyala" script="Ethi"/>
-        <a:font typeface="Vrinda" script="Beng"/>
-        <a:font typeface="Shruti" script="Gujr"/>
-        <a:font typeface="MoolBoran" script="Khmr"/>
-        <a:font typeface="Tunga" script="Knda"/>
-        <a:font typeface="Raavi" script="Guru"/>
-        <a:font typeface="Euphemia" script="Cans"/>
-        <a:font typeface="Plantagenet Cherokee" script="Cher"/>
-        <a:font typeface="Microsoft Yi Baiti" script="Yiii"/>
-        <a:font typeface="Microsoft Himalaya" script="Tibt"/>
-        <a:font typeface="MV Boli" script="Thaa"/>
-        <a:font typeface="Mangal" script="Deva"/>
-        <a:font typeface="Gautami" script="Telu"/>
-        <a:font typeface="Latha" script="Taml"/>
-        <a:font typeface="Estrangelo Edessa" script="Syrc"/>
-        <a:font typeface="Kalinga" script="Orya"/>
-        <a:font typeface="Kartika" script="Mlym"/>
-        <a:font typeface="DokChampa" script="Laoo"/>
-        <a:font typeface="Iskoola Pota" script="Sinh"/>
-        <a:font typeface="Mongolian Baiti" script="Mong"/>
-        <a:font typeface="Times New Roman" script="Viet"/>
-        <a:font typeface="Microsoft Uighur" script="Uigh"/>
-      </a:minorFont>
-    </a:fontScheme>
-    <a:fmtScheme name="Office">
-      <a:fillStyleLst>
-        <a:solidFill>
-          <a:schemeClr val="phClr"/>
-        </a:solidFill>
-        <a:gradFill rotWithShape="1">
-          <a:gsLst>
-            <a:gs pos="0">
-              <a:schemeClr val="phClr">
-                <a:tint val="50000"/>
-                <a:satMod val="300000"/>
-              </a:schemeClr>
-            </a:gs>
-            <a:gs pos="35000">
-              <a:schemeClr val="phClr">
-                <a:tint val="37000"/>
-                <a:satMod val="300000"/>
-              </a:schemeClr>
-            </a:gs>
-            <a:gs pos="100000">
-              <a:schemeClr val="phClr">
-                <a:tint val="15000"/>
-                <a:satMod val="350000"/>
-              </a:schemeClr>
-            </a:gs>
-          </a:gsLst>
-          <a:lin ang="16200000" scaled="1"/>
-        </a:gradFill>
-        <a:gradFill rotWithShape="1">
-          <a:gsLst>
-            <a:gs pos="0">
-              <a:schemeClr val="phClr">
-                <a:tint val="100000"/>
-                <a:shade val="100000"/>
-                <a:satMod val="130000"/>
-              </a:schemeClr>
-            </a:gs>
-            <a:gs pos="100000">
-              <a:schemeClr val="phClr">
-                <a:tint val="50000"/>
-                <a:shade val="100000"/>
-                <a:satMod val="350000"/>
-              </a:schemeClr>
-            </a:gs>
-          </a:gsLst>
-          <a:lin ang="16200000" scaled="0"/>
-        </a:gradFill>
-      </a:fillStyleLst>
-      <a:lnStyleLst>
-        <a:ln w="9525" algn="ctr" cap="flat" cmpd="sng">
-          <a:solidFill>
-            <a:schemeClr val="phClr">
-              <a:shade val="95000"/>
-              <a:satMod val="105000"/>
-            </a:schemeClr>
-          </a:solidFill>
-          <a:prstDash val="solid"/>
-        </a:ln>
-        <a:ln w="25400" algn="ctr" cap="flat" cmpd="sng">
-          <a:solidFill>
-            <a:schemeClr val="phClr"/>
-          </a:solidFill>
-          <a:prstDash val="solid"/>
-        </a:ln>
-        <a:ln w="38100" algn="ctr" cap="flat" cmpd="sng">
-          <a:solidFill>
-            <a:schemeClr val="phClr"/>
-          </a:solidFill>
-          <a:prstDash val="solid"/>
-        </a:ln>
-      </a:lnStyleLst>
-      <a:effectStyleLst>
-        <a:effectStyle>
-          <a:effectLst>
-            <a:outerShdw rotWithShape="0" dir="5400000" blurRad="40000" dist="20000">
-              <a:srgbClr val="000000">
-                <a:alpha val="38000"/>
-              </a:srgbClr>
-            </a:outerShdw>
-          </a:effectLst>
-        </a:effectStyle>
-        <a:effectStyle>
-          <a:effectLst>
-            <a:outerShdw rotWithShape="0" dir="5400000" blurRad="40000" dist="23000">
-              <a:srgbClr val="000000">
-                <a:alpha val="35000"/>
-              </a:srgbClr>
-            </a:outerShdw>
-          </a:effectLst>
-        </a:effectStyle>
-        <a:effectStyle>
-          <a:effectLst>
-            <a:outerShdw rotWithShape="0" dir="5400000" blurRad="40000" dist="23000">
-              <a:srgbClr val="000000">
-                <a:alpha val="35000"/>
-              </a:srgbClr>
-            </a:outerShdw>
-          </a:effectLst>
-          <a:scene3d>
-            <a:camera prst="orthographicFront">
-              <a:rot rev="0" lon="0" lat="0"/>
-            </a:camera>
-            <a:lightRig dir="t" rig="threePt">
-              <a:rot rev="1200000" lon="0" lat="0"/>
-            </a:lightRig>
-          </a:scene3d>
-          <a:sp3d>
-            <a:bevelT w="63500" h="25400"/>
-          </a:sp3d>
-        </a:effectStyle>
-      </a:effectStyleLst>
-      <a:bgFillStyleLst>
-        <a:solidFill>
-          <a:schemeClr val="phClr"/>
-        </a:solidFill>
-        <a:gradFill rotWithShape="1">
-          <a:gsLst>
-            <a:gs pos="0">
-              <a:schemeClr val="phClr">
-                <a:tint val="40000"/>
-                <a:satMod val="350000"/>
-              </a:schemeClr>
-            </a:gs>
-            <a:gs pos="40000">
-              <a:schemeClr val="phClr">
-                <a:tint val="45000"/>
-                <a:shade val="99000"/>
-                <a:satMod val="350000"/>
-              </a:schemeClr>
-            </a:gs>
-            <a:gs pos="100000">
-              <a:schemeClr val="phClr">
-                <a:shade val="20000"/>
-                <a:satMod val="255000"/>
-              </a:schemeClr>
-            </a:gs>
-          </a:gsLst>
-          <a:path path="circle">
-            <a:fillToRect t="-80000" b="180000" r="50000" l="50000"/>
-          </a:path>
-        </a:gradFill>
-        <a:gradFill rotWithShape="1">
-          <a:gsLst>
-            <a:gs pos="0">
-              <a:schemeClr val="phClr">
-                <a:tint val="80000"/>
-                <a:satMod val="300000"/>
-              </a:schemeClr>
-            </a:gs>
-            <a:gs pos="100000">
-              <a:schemeClr val="phClr">
-                <a:shade val="30000"/>
-                <a:satMod val="200000"/>
-              </a:schemeClr>
-            </a:gs>
-          </a:gsLst>
-          <a:path path="circle">
-            <a:fillToRect t="50000" b="50000" r="50000" l="50000"/>
-          </a:path>
-        </a:gradFill>
-      </a:bgFillStyleLst>
-    </a:fmtScheme>
-  </a:themeElements>
+  <a:objectDefaults/>
+  <a:extraClrSchemeLst/>
 </a:theme>
 </file>
</xml_diff>